<commit_message>
ppt tweaks and typo
</commit_message>
<xml_diff>
--- a/workshop/git_presentation.pptx
+++ b/workshop/git_presentation.pptx
@@ -8,8 +8,9 @@
     <p:sldId id="259" r:id="rId2"/>
     <p:sldId id="256" r:id="rId3"/>
     <p:sldId id="258" r:id="rId4"/>
-    <p:sldId id="260" r:id="rId5"/>
-    <p:sldId id="257" r:id="rId6"/>
+    <p:sldId id="261" r:id="rId5"/>
+    <p:sldId id="260" r:id="rId6"/>
+    <p:sldId id="257" r:id="rId7"/>
   </p:sldIdLst>
   <p:sldSz cx="9144000" cy="6858000" type="screen4x3"/>
   <p:notesSz cx="6858000" cy="9144000"/>
@@ -3181,6 +3182,17 @@
               <a:buNone/>
             </a:pPr>
             <a:r>
+              <a:rPr lang="en-US" sz="2000" dirty="0">
+                <a:solidFill>
+                  <a:schemeClr val="bg1">
+                    <a:lumMod val="50000"/>
+                  </a:schemeClr>
+                </a:solidFill>
+                <a:latin typeface="Lato Light"/>
+              </a:rPr>
+              <a:t>1</a:t>
+            </a:r>
+            <a:r>
               <a:rPr lang="en-US" sz="2000" dirty="0" smtClean="0">
                 <a:solidFill>
                   <a:schemeClr val="bg1">
@@ -3189,7 +3201,18 @@
                 </a:solidFill>
                 <a:latin typeface="Lato Light"/>
               </a:rPr>
-              <a:t>2/29/2015</a:t>
+              <a:t>/</a:t>
+            </a:r>
+            <a:r>
+              <a:rPr lang="en-US" sz="2000" dirty="0" smtClean="0">
+                <a:solidFill>
+                  <a:schemeClr val="bg1">
+                    <a:lumMod val="50000"/>
+                  </a:schemeClr>
+                </a:solidFill>
+                <a:latin typeface="Lato Light"/>
+              </a:rPr>
+              <a:t>29/2015</a:t>
             </a:r>
             <a:endParaRPr lang="en-US" sz="2000" dirty="0">
               <a:solidFill>
@@ -3239,6 +3262,132 @@
           <a:chExt cx="0" cy="0"/>
         </a:xfrm>
       </p:grpSpPr>
+      <p:sp>
+        <p:nvSpPr>
+          <p:cNvPr id="34" name="Rectangle 33"/>
+          <p:cNvSpPr/>
+          <p:nvPr/>
+        </p:nvSpPr>
+        <p:spPr>
+          <a:xfrm>
+            <a:off x="3801250" y="1782209"/>
+            <a:ext cx="681656" cy="896501"/>
+          </a:xfrm>
+          <a:prstGeom prst="rect">
+            <a:avLst/>
+          </a:prstGeom>
+          <a:solidFill>
+            <a:srgbClr val="FAAC15"/>
+          </a:solidFill>
+          <a:ln>
+            <a:solidFill>
+              <a:srgbClr val="FAAC15"/>
+            </a:solidFill>
+          </a:ln>
+          <a:effectLst/>
+        </p:spPr>
+        <p:style>
+          <a:lnRef idx="1">
+            <a:schemeClr val="accent1"/>
+          </a:lnRef>
+          <a:fillRef idx="3">
+            <a:schemeClr val="accent1"/>
+          </a:fillRef>
+          <a:effectRef idx="2">
+            <a:schemeClr val="accent1"/>
+          </a:effectRef>
+          <a:fontRef idx="minor">
+            <a:schemeClr val="lt1"/>
+          </a:fontRef>
+        </p:style>
+        <p:txBody>
+          <a:bodyPr rtlCol="0" anchor="ctr"/>
+          <a:lstStyle/>
+          <a:p>
+            <a:pPr algn="ctr"/>
+            <a:r>
+              <a:rPr lang="en-US" b="1" dirty="0" smtClean="0">
+                <a:solidFill>
+                  <a:schemeClr val="bg1"/>
+                </a:solidFill>
+                <a:latin typeface="Lato"/>
+                <a:cs typeface="Lato Black"/>
+              </a:rPr>
+              <a:t>File C</a:t>
+            </a:r>
+            <a:endParaRPr lang="en-US" b="1" dirty="0">
+              <a:solidFill>
+                <a:schemeClr val="bg1"/>
+              </a:solidFill>
+              <a:latin typeface="Lato"/>
+              <a:cs typeface="Lato Black"/>
+            </a:endParaRPr>
+          </a:p>
+        </p:txBody>
+      </p:sp>
+      <p:sp>
+        <p:nvSpPr>
+          <p:cNvPr id="38" name="Rectangle 37"/>
+          <p:cNvSpPr/>
+          <p:nvPr/>
+        </p:nvSpPr>
+        <p:spPr>
+          <a:xfrm>
+            <a:off x="3801250" y="1782209"/>
+            <a:ext cx="681656" cy="896501"/>
+          </a:xfrm>
+          <a:prstGeom prst="rect">
+            <a:avLst/>
+          </a:prstGeom>
+          <a:solidFill>
+            <a:srgbClr val="FAAC15"/>
+          </a:solidFill>
+          <a:ln>
+            <a:solidFill>
+              <a:srgbClr val="FAAC15"/>
+            </a:solidFill>
+          </a:ln>
+          <a:effectLst/>
+        </p:spPr>
+        <p:style>
+          <a:lnRef idx="1">
+            <a:schemeClr val="accent1"/>
+          </a:lnRef>
+          <a:fillRef idx="3">
+            <a:schemeClr val="accent1"/>
+          </a:fillRef>
+          <a:effectRef idx="2">
+            <a:schemeClr val="accent1"/>
+          </a:effectRef>
+          <a:fontRef idx="minor">
+            <a:schemeClr val="lt1"/>
+          </a:fontRef>
+        </p:style>
+        <p:txBody>
+          <a:bodyPr rtlCol="0" anchor="ctr"/>
+          <a:lstStyle/>
+          <a:p>
+            <a:pPr algn="ctr"/>
+            <a:r>
+              <a:rPr lang="en-US" b="1" dirty="0" smtClean="0">
+                <a:solidFill>
+                  <a:schemeClr val="bg1"/>
+                </a:solidFill>
+                <a:latin typeface="Lato"/>
+                <a:cs typeface="Lato Black"/>
+              </a:rPr>
+              <a:t>File C</a:t>
+            </a:r>
+            <a:endParaRPr lang="en-US" b="1" dirty="0">
+              <a:solidFill>
+                <a:schemeClr val="bg1"/>
+              </a:solidFill>
+              <a:latin typeface="Lato"/>
+              <a:cs typeface="Lato Black"/>
+            </a:endParaRPr>
+          </a:p>
+        </p:txBody>
+      </p:sp>
       <p:pic>
         <p:nvPicPr>
           <p:cNvPr id="27" name="Picture 26"/>
@@ -4062,7 +4211,7 @@
         </p:nvSpPr>
         <p:spPr>
           <a:xfrm>
-            <a:off x="3722303" y="1861128"/>
+            <a:off x="3660848" y="1861128"/>
             <a:ext cx="692264" cy="369332"/>
           </a:xfrm>
           <a:prstGeom prst="rect">
@@ -4124,51 +4273,6 @@
       </p:sp>
       <p:sp>
         <p:nvSpPr>
-          <p:cNvPr id="6" name="Rectangle 5"/>
-          <p:cNvSpPr/>
-          <p:nvPr/>
-        </p:nvSpPr>
-        <p:spPr>
-          <a:xfrm>
-            <a:off x="0" y="44849"/>
-            <a:ext cx="9144000" cy="6858000"/>
-          </a:xfrm>
-          <a:prstGeom prst="rect">
-            <a:avLst/>
-          </a:prstGeom>
-          <a:solidFill>
-            <a:srgbClr val="FF0000">
-              <a:alpha val="87000"/>
-            </a:srgbClr>
-          </a:solidFill>
-        </p:spPr>
-        <p:style>
-          <a:lnRef idx="1">
-            <a:schemeClr val="accent1"/>
-          </a:lnRef>
-          <a:fillRef idx="3">
-            <a:schemeClr val="accent1"/>
-          </a:fillRef>
-          <a:effectRef idx="2">
-            <a:schemeClr val="accent1"/>
-          </a:effectRef>
-          <a:fontRef idx="minor">
-            <a:schemeClr val="lt1"/>
-          </a:fontRef>
-        </p:style>
-        <p:txBody>
-          <a:bodyPr rtlCol="0" anchor="ctr"/>
-          <a:lstStyle/>
-          <a:p>
-            <a:pPr algn="ctr"/>
-            <a:endParaRPr lang="en-US" b="1">
-              <a:latin typeface="Lato"/>
-            </a:endParaRPr>
-          </a:p>
-        </p:txBody>
-      </p:sp>
-      <p:sp>
-        <p:nvSpPr>
           <p:cNvPr id="10" name="TextBox 9"/>
           <p:cNvSpPr txBox="1"/>
           <p:nvPr/>
@@ -4201,69 +4305,6 @@
               </a:rPr>
               <a:t>)</a:t>
             </a:r>
-          </a:p>
-        </p:txBody>
-      </p:sp>
-      <p:sp>
-        <p:nvSpPr>
-          <p:cNvPr id="34" name="Rectangle 33"/>
-          <p:cNvSpPr/>
-          <p:nvPr/>
-        </p:nvSpPr>
-        <p:spPr>
-          <a:xfrm>
-            <a:off x="3801250" y="1782209"/>
-            <a:ext cx="681656" cy="896501"/>
-          </a:xfrm>
-          <a:prstGeom prst="rect">
-            <a:avLst/>
-          </a:prstGeom>
-          <a:solidFill>
-            <a:srgbClr val="FAAC15"/>
-          </a:solidFill>
-          <a:ln>
-            <a:solidFill>
-              <a:srgbClr val="FAAC15"/>
-            </a:solidFill>
-          </a:ln>
-          <a:effectLst/>
-        </p:spPr>
-        <p:style>
-          <a:lnRef idx="1">
-            <a:schemeClr val="accent1"/>
-          </a:lnRef>
-          <a:fillRef idx="3">
-            <a:schemeClr val="accent1"/>
-          </a:fillRef>
-          <a:effectRef idx="2">
-            <a:schemeClr val="accent1"/>
-          </a:effectRef>
-          <a:fontRef idx="minor">
-            <a:schemeClr val="lt1"/>
-          </a:fontRef>
-        </p:style>
-        <p:txBody>
-          <a:bodyPr rtlCol="0" anchor="ctr"/>
-          <a:lstStyle/>
-          <a:p>
-            <a:pPr algn="ctr"/>
-            <a:r>
-              <a:rPr lang="en-US" b="1" dirty="0" smtClean="0">
-                <a:solidFill>
-                  <a:schemeClr val="bg1"/>
-                </a:solidFill>
-                <a:latin typeface="Lato"/>
-                <a:cs typeface="Lato Black"/>
-              </a:rPr>
-              <a:t>File C</a:t>
-            </a:r>
-            <a:endParaRPr lang="en-US" b="1" dirty="0">
-              <a:solidFill>
-                <a:schemeClr val="bg1"/>
-              </a:solidFill>
-              <a:latin typeface="Lato"/>
-              <a:cs typeface="Lato Black"/>
-            </a:endParaRPr>
           </a:p>
         </p:txBody>
       </p:sp>
@@ -4381,69 +4422,6 @@
       </p:sp>
       <p:sp>
         <p:nvSpPr>
-          <p:cNvPr id="38" name="Rectangle 37"/>
-          <p:cNvSpPr/>
-          <p:nvPr/>
-        </p:nvSpPr>
-        <p:spPr>
-          <a:xfrm>
-            <a:off x="3801250" y="1782209"/>
-            <a:ext cx="681656" cy="896501"/>
-          </a:xfrm>
-          <a:prstGeom prst="rect">
-            <a:avLst/>
-          </a:prstGeom>
-          <a:solidFill>
-            <a:srgbClr val="FAAC15"/>
-          </a:solidFill>
-          <a:ln>
-            <a:solidFill>
-              <a:srgbClr val="FAAC15"/>
-            </a:solidFill>
-          </a:ln>
-          <a:effectLst/>
-        </p:spPr>
-        <p:style>
-          <a:lnRef idx="1">
-            <a:schemeClr val="accent1"/>
-          </a:lnRef>
-          <a:fillRef idx="3">
-            <a:schemeClr val="accent1"/>
-          </a:fillRef>
-          <a:effectRef idx="2">
-            <a:schemeClr val="accent1"/>
-          </a:effectRef>
-          <a:fontRef idx="minor">
-            <a:schemeClr val="lt1"/>
-          </a:fontRef>
-        </p:style>
-        <p:txBody>
-          <a:bodyPr rtlCol="0" anchor="ctr"/>
-          <a:lstStyle/>
-          <a:p>
-            <a:pPr algn="ctr"/>
-            <a:r>
-              <a:rPr lang="en-US" b="1" dirty="0" smtClean="0">
-                <a:solidFill>
-                  <a:schemeClr val="bg1"/>
-                </a:solidFill>
-                <a:latin typeface="Lato"/>
-                <a:cs typeface="Lato Black"/>
-              </a:rPr>
-              <a:t>File C</a:t>
-            </a:r>
-            <a:endParaRPr lang="en-US" b="1" dirty="0">
-              <a:solidFill>
-                <a:schemeClr val="bg1"/>
-              </a:solidFill>
-              <a:latin typeface="Lato"/>
-              <a:cs typeface="Lato Black"/>
-            </a:endParaRPr>
-          </a:p>
-        </p:txBody>
-      </p:sp>
-      <p:sp>
-        <p:nvSpPr>
           <p:cNvPr id="40" name="Rectangle 39"/>
           <p:cNvSpPr/>
           <p:nvPr/>
@@ -4690,6 +4668,51 @@
               </a:rPr>
               <a:t>lone</a:t>
             </a:r>
+          </a:p>
+        </p:txBody>
+      </p:sp>
+      <p:sp>
+        <p:nvSpPr>
+          <p:cNvPr id="6" name="Rectangle 5"/>
+          <p:cNvSpPr/>
+          <p:nvPr/>
+        </p:nvSpPr>
+        <p:spPr>
+          <a:xfrm>
+            <a:off x="-835742" y="-639097"/>
+            <a:ext cx="10881032" cy="8218129"/>
+          </a:xfrm>
+          <a:prstGeom prst="rect">
+            <a:avLst/>
+          </a:prstGeom>
+          <a:solidFill>
+            <a:srgbClr val="FF0000">
+              <a:alpha val="87000"/>
+            </a:srgbClr>
+          </a:solidFill>
+        </p:spPr>
+        <p:style>
+          <a:lnRef idx="1">
+            <a:schemeClr val="accent1"/>
+          </a:lnRef>
+          <a:fillRef idx="3">
+            <a:schemeClr val="accent1"/>
+          </a:fillRef>
+          <a:effectRef idx="2">
+            <a:schemeClr val="accent1"/>
+          </a:effectRef>
+          <a:fontRef idx="minor">
+            <a:schemeClr val="lt1"/>
+          </a:fontRef>
+        </p:style>
+        <p:txBody>
+          <a:bodyPr rtlCol="0" anchor="ctr"/>
+          <a:lstStyle/>
+          <a:p>
+            <a:pPr algn="ctr"/>
+            <a:endParaRPr lang="en-US" b="1">
+              <a:latin typeface="Lato"/>
+            </a:endParaRPr>
           </a:p>
         </p:txBody>
       </p:sp>
@@ -7442,6 +7465,9 @@
       </p:par>
     </p:tnLst>
     <p:bldLst>
+      <p:bldP spid="34" grpId="0" animBg="1"/>
+      <p:bldP spid="38" grpId="0" animBg="1"/>
+      <p:bldP spid="38" grpId="1" animBg="1"/>
       <p:bldP spid="12" grpId="0" animBg="1"/>
       <p:bldP spid="12" grpId="1" animBg="1"/>
       <p:bldP spid="13" grpId="0" animBg="1"/>
@@ -7462,15 +7488,10 @@
       <p:bldP spid="5" grpId="1"/>
       <p:bldP spid="30" grpId="0"/>
       <p:bldP spid="30" grpId="1"/>
-      <p:bldP spid="6" grpId="0" animBg="1"/>
-      <p:bldP spid="6" grpId="1" animBg="1"/>
       <p:bldP spid="10" grpId="0"/>
       <p:bldP spid="10" grpId="1"/>
-      <p:bldP spid="34" grpId="0" animBg="1"/>
       <p:bldP spid="36" grpId="2" animBg="1"/>
       <p:bldP spid="37" grpId="2" animBg="1"/>
-      <p:bldP spid="38" grpId="0" animBg="1"/>
-      <p:bldP spid="38" grpId="1" animBg="1"/>
       <p:bldP spid="40" grpId="0" animBg="1"/>
       <p:bldP spid="40" grpId="1" animBg="1"/>
       <p:bldP spid="42" grpId="0" animBg="1"/>
@@ -7486,6 +7507,8 @@
       <p:bldP spid="45" grpId="1"/>
       <p:bldP spid="46" grpId="0"/>
       <p:bldP spid="46" grpId="1"/>
+      <p:bldP spid="6" grpId="0" animBg="1"/>
+      <p:bldP spid="6" grpId="1" animBg="1"/>
     </p:bldLst>
   </p:timing>
 </p:sld>
@@ -8697,6 +8720,2565 @@
 </file>
 
 <file path=ppt/slides/slide4.xml><?xml version="1.0" encoding="utf-8"?>
+<p:sld xmlns:a="http://schemas.openxmlformats.org/drawingml/2006/main" xmlns:r="http://schemas.openxmlformats.org/officeDocument/2006/relationships" xmlns:p="http://schemas.openxmlformats.org/presentationml/2006/main">
+  <p:cSld>
+    <p:spTree>
+      <p:nvGrpSpPr>
+        <p:cNvPr id="1" name=""/>
+        <p:cNvGrpSpPr/>
+        <p:nvPr/>
+      </p:nvGrpSpPr>
+      <p:grpSpPr>
+        <a:xfrm>
+          <a:off x="0" y="0"/>
+          <a:ext cx="0" cy="0"/>
+          <a:chOff x="0" y="0"/>
+          <a:chExt cx="0" cy="0"/>
+        </a:xfrm>
+      </p:grpSpPr>
+      <p:sp>
+        <p:nvSpPr>
+          <p:cNvPr id="25" name="Rectangle 24"/>
+          <p:cNvSpPr/>
+          <p:nvPr/>
+        </p:nvSpPr>
+        <p:spPr>
+          <a:xfrm>
+            <a:off x="4465053" y="-294969"/>
+            <a:ext cx="5350818" cy="7529871"/>
+          </a:xfrm>
+          <a:prstGeom prst="rect">
+            <a:avLst/>
+          </a:prstGeom>
+          <a:solidFill>
+            <a:schemeClr val="bg1">
+              <a:lumMod val="95000"/>
+            </a:schemeClr>
+          </a:solidFill>
+          <a:ln>
+            <a:noFill/>
+          </a:ln>
+          <a:effectLst/>
+        </p:spPr>
+        <p:style>
+          <a:lnRef idx="1">
+            <a:schemeClr val="accent1"/>
+          </a:lnRef>
+          <a:fillRef idx="3">
+            <a:schemeClr val="accent1"/>
+          </a:fillRef>
+          <a:effectRef idx="2">
+            <a:schemeClr val="accent1"/>
+          </a:effectRef>
+          <a:fontRef idx="minor">
+            <a:schemeClr val="lt1"/>
+          </a:fontRef>
+        </p:style>
+        <p:txBody>
+          <a:bodyPr rtlCol="0" anchor="ctr"/>
+          <a:lstStyle/>
+          <a:p>
+            <a:pPr algn="ctr"/>
+            <a:endParaRPr lang="en-US"/>
+          </a:p>
+        </p:txBody>
+      </p:sp>
+      <p:pic>
+        <p:nvPicPr>
+          <p:cNvPr id="4" name="Picture 3"/>
+          <p:cNvPicPr>
+            <a:picLocks noChangeAspect="1"/>
+          </p:cNvPicPr>
+          <p:nvPr/>
+        </p:nvPicPr>
+        <p:blipFill>
+          <a:blip r:embed="rId2"/>
+          <a:stretch>
+            <a:fillRect/>
+          </a:stretch>
+        </p:blipFill>
+        <p:spPr>
+          <a:xfrm>
+            <a:off x="944530" y="502257"/>
+            <a:ext cx="906696" cy="813925"/>
+          </a:xfrm>
+          <a:prstGeom prst="rect">
+            <a:avLst/>
+          </a:prstGeom>
+        </p:spPr>
+      </p:pic>
+      <p:sp>
+        <p:nvSpPr>
+          <p:cNvPr id="5" name="Rectangle 4"/>
+          <p:cNvSpPr/>
+          <p:nvPr/>
+        </p:nvSpPr>
+        <p:spPr>
+          <a:xfrm>
+            <a:off x="2067325" y="625350"/>
+            <a:ext cx="681656" cy="896501"/>
+          </a:xfrm>
+          <a:prstGeom prst="rect">
+            <a:avLst/>
+          </a:prstGeom>
+          <a:solidFill>
+            <a:srgbClr val="1882C8"/>
+          </a:solidFill>
+          <a:effectLst/>
+        </p:spPr>
+        <p:style>
+          <a:lnRef idx="1">
+            <a:schemeClr val="accent1"/>
+          </a:lnRef>
+          <a:fillRef idx="3">
+            <a:schemeClr val="accent1"/>
+          </a:fillRef>
+          <a:effectRef idx="2">
+            <a:schemeClr val="accent1"/>
+          </a:effectRef>
+          <a:fontRef idx="minor">
+            <a:schemeClr val="lt1"/>
+          </a:fontRef>
+        </p:style>
+        <p:txBody>
+          <a:bodyPr rtlCol="0" anchor="ctr"/>
+          <a:lstStyle/>
+          <a:p>
+            <a:pPr algn="ctr"/>
+            <a:r>
+              <a:rPr lang="en-US" dirty="0" smtClean="0">
+                <a:solidFill>
+                  <a:schemeClr val="bg1"/>
+                </a:solidFill>
+                <a:latin typeface="Lato Black"/>
+                <a:cs typeface="Lato Black"/>
+              </a:rPr>
+              <a:t>File A</a:t>
+            </a:r>
+            <a:endParaRPr lang="en-US" dirty="0">
+              <a:solidFill>
+                <a:schemeClr val="bg1"/>
+              </a:solidFill>
+              <a:latin typeface="Lato Black"/>
+              <a:cs typeface="Lato Black"/>
+            </a:endParaRPr>
+          </a:p>
+        </p:txBody>
+      </p:sp>
+      <p:sp>
+        <p:nvSpPr>
+          <p:cNvPr id="6" name="Rectangle 5"/>
+          <p:cNvSpPr/>
+          <p:nvPr/>
+        </p:nvSpPr>
+        <p:spPr>
+          <a:xfrm>
+            <a:off x="2901381" y="625350"/>
+            <a:ext cx="681656" cy="896501"/>
+          </a:xfrm>
+          <a:prstGeom prst="rect">
+            <a:avLst/>
+          </a:prstGeom>
+          <a:solidFill>
+            <a:srgbClr val="1882C8"/>
+          </a:solidFill>
+          <a:effectLst/>
+        </p:spPr>
+        <p:style>
+          <a:lnRef idx="1">
+            <a:schemeClr val="accent1"/>
+          </a:lnRef>
+          <a:fillRef idx="3">
+            <a:schemeClr val="accent1"/>
+          </a:fillRef>
+          <a:effectRef idx="2">
+            <a:schemeClr val="accent1"/>
+          </a:effectRef>
+          <a:fontRef idx="minor">
+            <a:schemeClr val="lt1"/>
+          </a:fontRef>
+        </p:style>
+        <p:txBody>
+          <a:bodyPr rtlCol="0" anchor="ctr"/>
+          <a:lstStyle/>
+          <a:p>
+            <a:pPr algn="ctr"/>
+            <a:r>
+              <a:rPr lang="en-US" dirty="0" smtClean="0">
+                <a:solidFill>
+                  <a:schemeClr val="bg1"/>
+                </a:solidFill>
+                <a:latin typeface="Lato Black"/>
+                <a:cs typeface="Lato Black"/>
+              </a:rPr>
+              <a:t>File B</a:t>
+            </a:r>
+            <a:endParaRPr lang="en-US" dirty="0">
+              <a:solidFill>
+                <a:schemeClr val="bg1"/>
+              </a:solidFill>
+              <a:latin typeface="Lato Black"/>
+              <a:cs typeface="Lato Black"/>
+            </a:endParaRPr>
+          </a:p>
+        </p:txBody>
+      </p:sp>
+      <p:sp>
+        <p:nvSpPr>
+          <p:cNvPr id="7" name="Rectangle 6"/>
+          <p:cNvSpPr/>
+          <p:nvPr/>
+        </p:nvSpPr>
+        <p:spPr>
+          <a:xfrm>
+            <a:off x="2067325" y="1851562"/>
+            <a:ext cx="681656" cy="896501"/>
+          </a:xfrm>
+          <a:prstGeom prst="rect">
+            <a:avLst/>
+          </a:prstGeom>
+          <a:solidFill>
+            <a:srgbClr val="FAAC15"/>
+          </a:solidFill>
+          <a:ln>
+            <a:solidFill>
+              <a:srgbClr val="FAAC15"/>
+            </a:solidFill>
+          </a:ln>
+          <a:effectLst/>
+        </p:spPr>
+        <p:style>
+          <a:lnRef idx="1">
+            <a:schemeClr val="accent1"/>
+          </a:lnRef>
+          <a:fillRef idx="3">
+            <a:schemeClr val="accent1"/>
+          </a:fillRef>
+          <a:effectRef idx="2">
+            <a:schemeClr val="accent1"/>
+          </a:effectRef>
+          <a:fontRef idx="minor">
+            <a:schemeClr val="lt1"/>
+          </a:fontRef>
+        </p:style>
+        <p:txBody>
+          <a:bodyPr rtlCol="0" anchor="ctr"/>
+          <a:lstStyle/>
+          <a:p>
+            <a:pPr algn="ctr"/>
+            <a:r>
+              <a:rPr lang="en-US" dirty="0" smtClean="0">
+                <a:solidFill>
+                  <a:schemeClr val="bg1"/>
+                </a:solidFill>
+                <a:latin typeface="Lato Black"/>
+                <a:cs typeface="Lato Black"/>
+              </a:rPr>
+              <a:t>File C</a:t>
+            </a:r>
+            <a:endParaRPr lang="en-US" dirty="0">
+              <a:solidFill>
+                <a:schemeClr val="bg1"/>
+              </a:solidFill>
+              <a:latin typeface="Lato Black"/>
+              <a:cs typeface="Lato Black"/>
+            </a:endParaRPr>
+          </a:p>
+        </p:txBody>
+      </p:sp>
+      <p:sp>
+        <p:nvSpPr>
+          <p:cNvPr id="8" name="Rectangle 7"/>
+          <p:cNvSpPr/>
+          <p:nvPr/>
+        </p:nvSpPr>
+        <p:spPr>
+          <a:xfrm>
+            <a:off x="2067325" y="2748063"/>
+            <a:ext cx="681656" cy="443260"/>
+          </a:xfrm>
+          <a:prstGeom prst="rect">
+            <a:avLst/>
+          </a:prstGeom>
+          <a:solidFill>
+            <a:srgbClr val="FFD37F"/>
+          </a:solidFill>
+          <a:ln>
+            <a:solidFill>
+              <a:srgbClr val="FFD37F"/>
+            </a:solidFill>
+          </a:ln>
+          <a:effectLst/>
+        </p:spPr>
+        <p:style>
+          <a:lnRef idx="1">
+            <a:schemeClr val="accent1"/>
+          </a:lnRef>
+          <a:fillRef idx="3">
+            <a:schemeClr val="accent1"/>
+          </a:fillRef>
+          <a:effectRef idx="2">
+            <a:schemeClr val="accent1"/>
+          </a:effectRef>
+          <a:fontRef idx="minor">
+            <a:schemeClr val="lt1"/>
+          </a:fontRef>
+        </p:style>
+        <p:txBody>
+          <a:bodyPr rtlCol="0" anchor="ctr"/>
+          <a:lstStyle/>
+          <a:p>
+            <a:pPr algn="ctr"/>
+            <a:endParaRPr lang="en-US"/>
+          </a:p>
+        </p:txBody>
+      </p:sp>
+      <p:sp>
+        <p:nvSpPr>
+          <p:cNvPr id="9" name="Rectangle 8"/>
+          <p:cNvSpPr/>
+          <p:nvPr/>
+        </p:nvSpPr>
+        <p:spPr>
+          <a:xfrm>
+            <a:off x="2901381" y="1521851"/>
+            <a:ext cx="681656" cy="187463"/>
+          </a:xfrm>
+          <a:prstGeom prst="rect">
+            <a:avLst/>
+          </a:prstGeom>
+          <a:solidFill>
+            <a:srgbClr val="A2CBEE"/>
+          </a:solidFill>
+          <a:ln>
+            <a:solidFill>
+              <a:srgbClr val="A2CBEE"/>
+            </a:solidFill>
+          </a:ln>
+          <a:effectLst/>
+        </p:spPr>
+        <p:style>
+          <a:lnRef idx="1">
+            <a:schemeClr val="accent1"/>
+          </a:lnRef>
+          <a:fillRef idx="3">
+            <a:schemeClr val="accent1"/>
+          </a:fillRef>
+          <a:effectRef idx="2">
+            <a:schemeClr val="accent1"/>
+          </a:effectRef>
+          <a:fontRef idx="minor">
+            <a:schemeClr val="lt1"/>
+          </a:fontRef>
+        </p:style>
+        <p:txBody>
+          <a:bodyPr rtlCol="0" anchor="ctr"/>
+          <a:lstStyle/>
+          <a:p>
+            <a:pPr algn="ctr"/>
+            <a:endParaRPr lang="en-US"/>
+          </a:p>
+        </p:txBody>
+      </p:sp>
+      <p:pic>
+        <p:nvPicPr>
+          <p:cNvPr id="10" name="Picture 9"/>
+          <p:cNvPicPr>
+            <a:picLocks noChangeAspect="1"/>
+          </p:cNvPicPr>
+          <p:nvPr/>
+        </p:nvPicPr>
+        <p:blipFill>
+          <a:blip r:embed="rId3"/>
+          <a:stretch>
+            <a:fillRect/>
+          </a:stretch>
+        </p:blipFill>
+        <p:spPr>
+          <a:xfrm>
+            <a:off x="2590467" y="4848276"/>
+            <a:ext cx="621828" cy="903819"/>
+          </a:xfrm>
+          <a:prstGeom prst="rect">
+            <a:avLst/>
+          </a:prstGeom>
+        </p:spPr>
+      </p:pic>
+      <p:pic>
+        <p:nvPicPr>
+          <p:cNvPr id="11" name="Picture 10"/>
+          <p:cNvPicPr>
+            <a:picLocks noChangeAspect="1"/>
+          </p:cNvPicPr>
+          <p:nvPr/>
+        </p:nvPicPr>
+        <p:blipFill>
+          <a:blip r:embed="rId4"/>
+          <a:stretch>
+            <a:fillRect/>
+          </a:stretch>
+        </p:blipFill>
+        <p:spPr>
+          <a:xfrm>
+            <a:off x="2599858" y="5904349"/>
+            <a:ext cx="612437" cy="819458"/>
+          </a:xfrm>
+          <a:prstGeom prst="rect">
+            <a:avLst/>
+          </a:prstGeom>
+        </p:spPr>
+      </p:pic>
+      <p:sp>
+        <p:nvSpPr>
+          <p:cNvPr id="12" name="Rectangle 11"/>
+          <p:cNvSpPr/>
+          <p:nvPr/>
+        </p:nvSpPr>
+        <p:spPr>
+          <a:xfrm>
+            <a:off x="2067325" y="625350"/>
+            <a:ext cx="681656" cy="896501"/>
+          </a:xfrm>
+          <a:prstGeom prst="rect">
+            <a:avLst/>
+          </a:prstGeom>
+          <a:solidFill>
+            <a:srgbClr val="1882C8"/>
+          </a:solidFill>
+          <a:effectLst/>
+        </p:spPr>
+        <p:style>
+          <a:lnRef idx="1">
+            <a:schemeClr val="accent1"/>
+          </a:lnRef>
+          <a:fillRef idx="3">
+            <a:schemeClr val="accent1"/>
+          </a:fillRef>
+          <a:effectRef idx="2">
+            <a:schemeClr val="accent1"/>
+          </a:effectRef>
+          <a:fontRef idx="minor">
+            <a:schemeClr val="lt1"/>
+          </a:fontRef>
+        </p:style>
+        <p:txBody>
+          <a:bodyPr rtlCol="0" anchor="ctr"/>
+          <a:lstStyle/>
+          <a:p>
+            <a:pPr algn="ctr"/>
+            <a:r>
+              <a:rPr lang="en-US" dirty="0" smtClean="0">
+                <a:solidFill>
+                  <a:schemeClr val="bg1"/>
+                </a:solidFill>
+                <a:latin typeface="Lato Black"/>
+                <a:cs typeface="Lato Black"/>
+              </a:rPr>
+              <a:t>File A</a:t>
+            </a:r>
+            <a:endParaRPr lang="en-US" dirty="0">
+              <a:solidFill>
+                <a:schemeClr val="bg1"/>
+              </a:solidFill>
+              <a:latin typeface="Lato Black"/>
+              <a:cs typeface="Lato Black"/>
+            </a:endParaRPr>
+          </a:p>
+        </p:txBody>
+      </p:sp>
+      <p:sp>
+        <p:nvSpPr>
+          <p:cNvPr id="13" name="Rectangle 12"/>
+          <p:cNvSpPr/>
+          <p:nvPr/>
+        </p:nvSpPr>
+        <p:spPr>
+          <a:xfrm>
+            <a:off x="2901381" y="625350"/>
+            <a:ext cx="681656" cy="896501"/>
+          </a:xfrm>
+          <a:prstGeom prst="rect">
+            <a:avLst/>
+          </a:prstGeom>
+          <a:solidFill>
+            <a:srgbClr val="1882C8"/>
+          </a:solidFill>
+          <a:effectLst/>
+        </p:spPr>
+        <p:style>
+          <a:lnRef idx="1">
+            <a:schemeClr val="accent1"/>
+          </a:lnRef>
+          <a:fillRef idx="3">
+            <a:schemeClr val="accent1"/>
+          </a:fillRef>
+          <a:effectRef idx="2">
+            <a:schemeClr val="accent1"/>
+          </a:effectRef>
+          <a:fontRef idx="minor">
+            <a:schemeClr val="lt1"/>
+          </a:fontRef>
+        </p:style>
+        <p:txBody>
+          <a:bodyPr rtlCol="0" anchor="ctr"/>
+          <a:lstStyle/>
+          <a:p>
+            <a:pPr algn="ctr"/>
+            <a:r>
+              <a:rPr lang="en-US" dirty="0" smtClean="0">
+                <a:solidFill>
+                  <a:schemeClr val="bg1"/>
+                </a:solidFill>
+                <a:latin typeface="Lato Black"/>
+                <a:cs typeface="Lato Black"/>
+              </a:rPr>
+              <a:t>File B</a:t>
+            </a:r>
+            <a:endParaRPr lang="en-US" dirty="0">
+              <a:solidFill>
+                <a:schemeClr val="bg1"/>
+              </a:solidFill>
+              <a:latin typeface="Lato Black"/>
+              <a:cs typeface="Lato Black"/>
+            </a:endParaRPr>
+          </a:p>
+        </p:txBody>
+      </p:sp>
+      <p:sp>
+        <p:nvSpPr>
+          <p:cNvPr id="14" name="Rectangle 13"/>
+          <p:cNvSpPr/>
+          <p:nvPr/>
+        </p:nvSpPr>
+        <p:spPr>
+          <a:xfrm>
+            <a:off x="2067325" y="1851562"/>
+            <a:ext cx="681656" cy="896501"/>
+          </a:xfrm>
+          <a:prstGeom prst="rect">
+            <a:avLst/>
+          </a:prstGeom>
+          <a:solidFill>
+            <a:srgbClr val="FAAC15"/>
+          </a:solidFill>
+          <a:ln>
+            <a:solidFill>
+              <a:srgbClr val="FAAC15"/>
+            </a:solidFill>
+          </a:ln>
+          <a:effectLst/>
+        </p:spPr>
+        <p:style>
+          <a:lnRef idx="1">
+            <a:schemeClr val="accent1"/>
+          </a:lnRef>
+          <a:fillRef idx="3">
+            <a:schemeClr val="accent1"/>
+          </a:fillRef>
+          <a:effectRef idx="2">
+            <a:schemeClr val="accent1"/>
+          </a:effectRef>
+          <a:fontRef idx="minor">
+            <a:schemeClr val="lt1"/>
+          </a:fontRef>
+        </p:style>
+        <p:txBody>
+          <a:bodyPr rtlCol="0" anchor="ctr"/>
+          <a:lstStyle/>
+          <a:p>
+            <a:pPr algn="ctr"/>
+            <a:r>
+              <a:rPr lang="en-US" dirty="0" smtClean="0">
+                <a:solidFill>
+                  <a:schemeClr val="bg1"/>
+                </a:solidFill>
+                <a:latin typeface="Lato Black"/>
+                <a:cs typeface="Lato Black"/>
+              </a:rPr>
+              <a:t>File C</a:t>
+            </a:r>
+            <a:endParaRPr lang="en-US" dirty="0">
+              <a:solidFill>
+                <a:schemeClr val="bg1"/>
+              </a:solidFill>
+              <a:latin typeface="Lato Black"/>
+              <a:cs typeface="Lato Black"/>
+            </a:endParaRPr>
+          </a:p>
+        </p:txBody>
+      </p:sp>
+      <p:sp>
+        <p:nvSpPr>
+          <p:cNvPr id="15" name="Rectangle 14"/>
+          <p:cNvSpPr/>
+          <p:nvPr/>
+        </p:nvSpPr>
+        <p:spPr>
+          <a:xfrm>
+            <a:off x="2067325" y="2748063"/>
+            <a:ext cx="681656" cy="443260"/>
+          </a:xfrm>
+          <a:prstGeom prst="rect">
+            <a:avLst/>
+          </a:prstGeom>
+          <a:solidFill>
+            <a:srgbClr val="FFD37F"/>
+          </a:solidFill>
+          <a:ln>
+            <a:solidFill>
+              <a:srgbClr val="FFD37F"/>
+            </a:solidFill>
+          </a:ln>
+          <a:effectLst/>
+        </p:spPr>
+        <p:style>
+          <a:lnRef idx="1">
+            <a:schemeClr val="accent1"/>
+          </a:lnRef>
+          <a:fillRef idx="3">
+            <a:schemeClr val="accent1"/>
+          </a:fillRef>
+          <a:effectRef idx="2">
+            <a:schemeClr val="accent1"/>
+          </a:effectRef>
+          <a:fontRef idx="minor">
+            <a:schemeClr val="lt1"/>
+          </a:fontRef>
+        </p:style>
+        <p:txBody>
+          <a:bodyPr rtlCol="0" anchor="ctr"/>
+          <a:lstStyle/>
+          <a:p>
+            <a:pPr algn="ctr"/>
+            <a:endParaRPr lang="en-US"/>
+          </a:p>
+        </p:txBody>
+      </p:sp>
+      <p:sp>
+        <p:nvSpPr>
+          <p:cNvPr id="16" name="Rectangle 15"/>
+          <p:cNvSpPr/>
+          <p:nvPr/>
+        </p:nvSpPr>
+        <p:spPr>
+          <a:xfrm>
+            <a:off x="2901381" y="1521851"/>
+            <a:ext cx="681656" cy="187463"/>
+          </a:xfrm>
+          <a:prstGeom prst="rect">
+            <a:avLst/>
+          </a:prstGeom>
+          <a:solidFill>
+            <a:srgbClr val="A2CBEE"/>
+          </a:solidFill>
+          <a:ln>
+            <a:solidFill>
+              <a:srgbClr val="A2CBEE"/>
+            </a:solidFill>
+          </a:ln>
+          <a:effectLst/>
+        </p:spPr>
+        <p:style>
+          <a:lnRef idx="1">
+            <a:schemeClr val="accent1"/>
+          </a:lnRef>
+          <a:fillRef idx="3">
+            <a:schemeClr val="accent1"/>
+          </a:fillRef>
+          <a:effectRef idx="2">
+            <a:schemeClr val="accent1"/>
+          </a:effectRef>
+          <a:fontRef idx="minor">
+            <a:schemeClr val="lt1"/>
+          </a:fontRef>
+        </p:style>
+        <p:txBody>
+          <a:bodyPr rtlCol="0" anchor="ctr"/>
+          <a:lstStyle/>
+          <a:p>
+            <a:pPr algn="ctr"/>
+            <a:endParaRPr lang="en-US"/>
+          </a:p>
+        </p:txBody>
+      </p:sp>
+      <p:sp>
+        <p:nvSpPr>
+          <p:cNvPr id="19" name="Rectangle 18"/>
+          <p:cNvSpPr/>
+          <p:nvPr/>
+        </p:nvSpPr>
+        <p:spPr>
+          <a:xfrm>
+            <a:off x="2902709" y="1709314"/>
+            <a:ext cx="681656" cy="224046"/>
+          </a:xfrm>
+          <a:prstGeom prst="rect">
+            <a:avLst/>
+          </a:prstGeom>
+          <a:solidFill>
+            <a:srgbClr val="FFD37F"/>
+          </a:solidFill>
+          <a:ln>
+            <a:solidFill>
+              <a:srgbClr val="FFD37F"/>
+            </a:solidFill>
+          </a:ln>
+          <a:effectLst/>
+        </p:spPr>
+        <p:style>
+          <a:lnRef idx="1">
+            <a:schemeClr val="accent1"/>
+          </a:lnRef>
+          <a:fillRef idx="3">
+            <a:schemeClr val="accent1"/>
+          </a:fillRef>
+          <a:effectRef idx="2">
+            <a:schemeClr val="accent1"/>
+          </a:effectRef>
+          <a:fontRef idx="minor">
+            <a:schemeClr val="lt1"/>
+          </a:fontRef>
+        </p:style>
+        <p:txBody>
+          <a:bodyPr rtlCol="0" anchor="ctr"/>
+          <a:lstStyle/>
+          <a:p>
+            <a:pPr algn="ctr"/>
+            <a:endParaRPr lang="en-US"/>
+          </a:p>
+        </p:txBody>
+      </p:sp>
+      <p:cxnSp>
+        <p:nvCxnSpPr>
+          <p:cNvPr id="20" name="Straight Arrow Connector 19"/>
+          <p:cNvCxnSpPr/>
+          <p:nvPr/>
+        </p:nvCxnSpPr>
+        <p:spPr>
+          <a:xfrm flipV="1">
+            <a:off x="2896631" y="3471090"/>
+            <a:ext cx="0" cy="1127647"/>
+          </a:xfrm>
+          <a:prstGeom prst="straightConnector1">
+            <a:avLst/>
+          </a:prstGeom>
+          <a:ln w="76200" cap="sq" cmpd="sng">
+            <a:solidFill>
+              <a:schemeClr val="tx1"/>
+            </a:solidFill>
+            <a:round/>
+            <a:headEnd type="none"/>
+            <a:tailEnd type="triangle" w="med" len="med"/>
+          </a:ln>
+          <a:effectLst/>
+        </p:spPr>
+        <p:style>
+          <a:lnRef idx="2">
+            <a:schemeClr val="accent1"/>
+          </a:lnRef>
+          <a:fillRef idx="0">
+            <a:schemeClr val="accent1"/>
+          </a:fillRef>
+          <a:effectRef idx="1">
+            <a:schemeClr val="accent1"/>
+          </a:effectRef>
+          <a:fontRef idx="minor">
+            <a:schemeClr val="tx1"/>
+          </a:fontRef>
+        </p:style>
+      </p:cxnSp>
+      <p:sp>
+        <p:nvSpPr>
+          <p:cNvPr id="21" name="Rectangle 20"/>
+          <p:cNvSpPr/>
+          <p:nvPr/>
+        </p:nvSpPr>
+        <p:spPr>
+          <a:xfrm>
+            <a:off x="6916386" y="1709314"/>
+            <a:ext cx="681656" cy="375073"/>
+          </a:xfrm>
+          <a:prstGeom prst="rect">
+            <a:avLst/>
+          </a:prstGeom>
+          <a:solidFill>
+            <a:srgbClr val="A2CBEE"/>
+          </a:solidFill>
+          <a:ln>
+            <a:solidFill>
+              <a:srgbClr val="A2CBEE"/>
+            </a:solidFill>
+          </a:ln>
+          <a:effectLst/>
+        </p:spPr>
+        <p:style>
+          <a:lnRef idx="1">
+            <a:schemeClr val="accent1"/>
+          </a:lnRef>
+          <a:fillRef idx="3">
+            <a:schemeClr val="accent1"/>
+          </a:fillRef>
+          <a:effectRef idx="2">
+            <a:schemeClr val="accent1"/>
+          </a:effectRef>
+          <a:fontRef idx="minor">
+            <a:schemeClr val="lt1"/>
+          </a:fontRef>
+        </p:style>
+        <p:txBody>
+          <a:bodyPr rtlCol="0" anchor="ctr"/>
+          <a:lstStyle/>
+          <a:p>
+            <a:pPr algn="ctr"/>
+            <a:endParaRPr lang="en-US"/>
+          </a:p>
+        </p:txBody>
+      </p:sp>
+      <p:sp>
+        <p:nvSpPr>
+          <p:cNvPr id="22" name="Rectangle 21"/>
+          <p:cNvSpPr/>
+          <p:nvPr/>
+        </p:nvSpPr>
+        <p:spPr>
+          <a:xfrm>
+            <a:off x="6080253" y="3191323"/>
+            <a:ext cx="681656" cy="375073"/>
+          </a:xfrm>
+          <a:prstGeom prst="rect">
+            <a:avLst/>
+          </a:prstGeom>
+          <a:solidFill>
+            <a:srgbClr val="A2CBEE"/>
+          </a:solidFill>
+          <a:ln>
+            <a:solidFill>
+              <a:srgbClr val="A2CBEE"/>
+            </a:solidFill>
+          </a:ln>
+          <a:effectLst/>
+        </p:spPr>
+        <p:style>
+          <a:lnRef idx="1">
+            <a:schemeClr val="accent1"/>
+          </a:lnRef>
+          <a:fillRef idx="3">
+            <a:schemeClr val="accent1"/>
+          </a:fillRef>
+          <a:effectRef idx="2">
+            <a:schemeClr val="accent1"/>
+          </a:effectRef>
+          <a:fontRef idx="minor">
+            <a:schemeClr val="lt1"/>
+          </a:fontRef>
+        </p:style>
+        <p:txBody>
+          <a:bodyPr rtlCol="0" anchor="ctr"/>
+          <a:lstStyle/>
+          <a:p>
+            <a:pPr algn="ctr"/>
+            <a:endParaRPr lang="en-US"/>
+          </a:p>
+        </p:txBody>
+      </p:sp>
+      <p:cxnSp>
+        <p:nvCxnSpPr>
+          <p:cNvPr id="24" name="Straight Arrow Connector 23"/>
+          <p:cNvCxnSpPr/>
+          <p:nvPr/>
+        </p:nvCxnSpPr>
+        <p:spPr>
+          <a:xfrm flipV="1">
+            <a:off x="6897812" y="3471090"/>
+            <a:ext cx="0" cy="1127647"/>
+          </a:xfrm>
+          <a:prstGeom prst="straightConnector1">
+            <a:avLst/>
+          </a:prstGeom>
+          <a:ln w="76200" cap="sq" cmpd="sng">
+            <a:solidFill>
+              <a:schemeClr val="tx1"/>
+            </a:solidFill>
+            <a:round/>
+            <a:headEnd type="none"/>
+            <a:tailEnd type="triangle" w="med" len="med"/>
+          </a:ln>
+          <a:effectLst/>
+        </p:spPr>
+        <p:style>
+          <a:lnRef idx="2">
+            <a:schemeClr val="accent1"/>
+          </a:lnRef>
+          <a:fillRef idx="0">
+            <a:schemeClr val="accent1"/>
+          </a:fillRef>
+          <a:effectRef idx="1">
+            <a:schemeClr val="accent1"/>
+          </a:effectRef>
+          <a:fontRef idx="minor">
+            <a:schemeClr val="tx1"/>
+          </a:fontRef>
+        </p:style>
+      </p:cxnSp>
+      <p:sp>
+        <p:nvSpPr>
+          <p:cNvPr id="30" name="TextBox 29"/>
+          <p:cNvSpPr txBox="1"/>
+          <p:nvPr/>
+        </p:nvSpPr>
+        <p:spPr>
+          <a:xfrm>
+            <a:off x="2397865" y="128997"/>
+            <a:ext cx="891463" cy="369332"/>
+          </a:xfrm>
+          <a:prstGeom prst="rect">
+            <a:avLst/>
+          </a:prstGeom>
+          <a:noFill/>
+        </p:spPr>
+        <p:txBody>
+          <a:bodyPr wrap="none" rtlCol="0">
+            <a:spAutoFit/>
+          </a:bodyPr>
+          <a:lstStyle/>
+          <a:p>
+            <a:r>
+              <a:rPr lang="en-US" dirty="0" smtClean="0">
+                <a:latin typeface="Lato"/>
+              </a:rPr>
+              <a:t>master</a:t>
+            </a:r>
+            <a:endParaRPr lang="en-US" dirty="0" smtClean="0">
+              <a:latin typeface="Lato"/>
+            </a:endParaRPr>
+          </a:p>
+        </p:txBody>
+      </p:sp>
+      <p:sp>
+        <p:nvSpPr>
+          <p:cNvPr id="31" name="TextBox 30"/>
+          <p:cNvSpPr txBox="1"/>
+          <p:nvPr/>
+        </p:nvSpPr>
+        <p:spPr>
+          <a:xfrm>
+            <a:off x="5705585" y="151047"/>
+            <a:ext cx="2337605" cy="369332"/>
+          </a:xfrm>
+          <a:prstGeom prst="rect">
+            <a:avLst/>
+          </a:prstGeom>
+          <a:noFill/>
+        </p:spPr>
+        <p:txBody>
+          <a:bodyPr wrap="none" rtlCol="0">
+            <a:spAutoFit/>
+          </a:bodyPr>
+          <a:lstStyle/>
+          <a:p>
+            <a:r>
+              <a:rPr lang="en-US" dirty="0" smtClean="0">
+                <a:latin typeface="Lato"/>
+              </a:rPr>
+              <a:t>bars-rule-maps-drool</a:t>
+            </a:r>
+            <a:endParaRPr lang="en-US" dirty="0" smtClean="0">
+              <a:latin typeface="Lato"/>
+            </a:endParaRPr>
+          </a:p>
+        </p:txBody>
+      </p:sp>
+      <p:sp>
+        <p:nvSpPr>
+          <p:cNvPr id="32" name="Rectangle 31"/>
+          <p:cNvSpPr/>
+          <p:nvPr/>
+        </p:nvSpPr>
+        <p:spPr>
+          <a:xfrm>
+            <a:off x="2905744" y="2182448"/>
+            <a:ext cx="681656" cy="896501"/>
+          </a:xfrm>
+          <a:prstGeom prst="rect">
+            <a:avLst/>
+          </a:prstGeom>
+          <a:solidFill>
+            <a:srgbClr val="FAAC15"/>
+          </a:solidFill>
+          <a:ln>
+            <a:solidFill>
+              <a:srgbClr val="FAAC15"/>
+            </a:solidFill>
+          </a:ln>
+          <a:effectLst/>
+        </p:spPr>
+        <p:style>
+          <a:lnRef idx="1">
+            <a:schemeClr val="accent1"/>
+          </a:lnRef>
+          <a:fillRef idx="3">
+            <a:schemeClr val="accent1"/>
+          </a:fillRef>
+          <a:effectRef idx="2">
+            <a:schemeClr val="accent1"/>
+          </a:effectRef>
+          <a:fontRef idx="minor">
+            <a:schemeClr val="lt1"/>
+          </a:fontRef>
+        </p:style>
+        <p:txBody>
+          <a:bodyPr rtlCol="0" anchor="ctr"/>
+          <a:lstStyle/>
+          <a:p>
+            <a:pPr algn="ctr"/>
+            <a:r>
+              <a:rPr lang="en-US" dirty="0" smtClean="0">
+                <a:solidFill>
+                  <a:schemeClr val="bg1"/>
+                </a:solidFill>
+                <a:latin typeface="Lato Black"/>
+                <a:cs typeface="Lato Black"/>
+              </a:rPr>
+              <a:t>File </a:t>
+            </a:r>
+            <a:r>
+              <a:rPr lang="en-US" dirty="0" smtClean="0">
+                <a:solidFill>
+                  <a:schemeClr val="bg1"/>
+                </a:solidFill>
+                <a:latin typeface="Lato Black"/>
+                <a:cs typeface="Lato Black"/>
+              </a:rPr>
+              <a:t>D</a:t>
+            </a:r>
+            <a:endParaRPr lang="en-US" dirty="0">
+              <a:solidFill>
+                <a:schemeClr val="bg1"/>
+              </a:solidFill>
+              <a:latin typeface="Lato Black"/>
+              <a:cs typeface="Lato Black"/>
+            </a:endParaRPr>
+          </a:p>
+        </p:txBody>
+      </p:sp>
+    </p:spTree>
+    <p:extLst>
+      <p:ext uri="{BB962C8B-B14F-4D97-AF65-F5344CB8AC3E}">
+        <p14:creationId xmlns:p14="http://schemas.microsoft.com/office/powerpoint/2010/main" val="911713122"/>
+      </p:ext>
+    </p:extLst>
+  </p:cSld>
+  <p:clrMapOvr>
+    <a:masterClrMapping/>
+  </p:clrMapOvr>
+  <p:timing>
+    <p:tnLst>
+      <p:par>
+        <p:cTn xmlns:p14="http://schemas.microsoft.com/office/powerpoint/2010/main" id="1" dur="indefinite" restart="never" nodeType="tmRoot">
+          <p:childTnLst>
+            <p:seq concurrent="1" nextAc="seek">
+              <p:cTn id="2" dur="indefinite" nodeType="mainSeq">
+                <p:childTnLst>
+                  <p:par>
+                    <p:cTn id="3" fill="hold">
+                      <p:stCondLst>
+                        <p:cond delay="indefinite"/>
+                      </p:stCondLst>
+                      <p:childTnLst>
+                        <p:par>
+                          <p:cTn id="4" fill="hold">
+                            <p:stCondLst>
+                              <p:cond delay="0"/>
+                            </p:stCondLst>
+                            <p:childTnLst>
+                              <p:par>
+                                <p:cTn id="5" presetID="0" presetClass="path" presetSubtype="0" accel="50000" decel="50000" fill="hold" grpId="0" nodeType="clickEffect">
+                                  <p:stCondLst>
+                                    <p:cond delay="0"/>
+                                  </p:stCondLst>
+                                  <p:childTnLst>
+                                    <p:animMotion origin="layout" path="M 0 0 L 0.43924 0 " pathEditMode="relative" ptsTypes="AA">
+                                      <p:cBhvr>
+                                        <p:cTn id="6" dur="2000" fill="hold"/>
+                                        <p:tgtEl>
+                                          <p:spTgt spid="13"/>
+                                        </p:tgtEl>
+                                        <p:attrNameLst>
+                                          <p:attrName>ppt_x</p:attrName>
+                                          <p:attrName>ppt_y</p:attrName>
+                                        </p:attrNameLst>
+                                      </p:cBhvr>
+                                    </p:animMotion>
+                                  </p:childTnLst>
+                                </p:cTn>
+                              </p:par>
+                              <p:par>
+                                <p:cTn id="7" presetID="0" presetClass="path" presetSubtype="0" accel="50000" decel="50000" fill="hold" grpId="0" nodeType="withEffect">
+                                  <p:stCondLst>
+                                    <p:cond delay="0"/>
+                                  </p:stCondLst>
+                                  <p:childTnLst>
+                                    <p:animMotion origin="layout" path="M 0 0 L 0.43924 0 " pathEditMode="relative" ptsTypes="AA">
+                                      <p:cBhvr>
+                                        <p:cTn id="8" dur="2000" fill="hold"/>
+                                        <p:tgtEl>
+                                          <p:spTgt spid="12"/>
+                                        </p:tgtEl>
+                                        <p:attrNameLst>
+                                          <p:attrName>ppt_x</p:attrName>
+                                          <p:attrName>ppt_y</p:attrName>
+                                        </p:attrNameLst>
+                                      </p:cBhvr>
+                                    </p:animMotion>
+                                  </p:childTnLst>
+                                </p:cTn>
+                              </p:par>
+                              <p:par>
+                                <p:cTn id="9" presetID="0" presetClass="path" presetSubtype="0" accel="50000" decel="50000" fill="hold" grpId="0" nodeType="withEffect">
+                                  <p:stCondLst>
+                                    <p:cond delay="0"/>
+                                  </p:stCondLst>
+                                  <p:childTnLst>
+                                    <p:animMotion origin="layout" path="M 0 0 L 0.43924 0 " pathEditMode="relative" ptsTypes="AA">
+                                      <p:cBhvr>
+                                        <p:cTn id="10" dur="2000" fill="hold"/>
+                                        <p:tgtEl>
+                                          <p:spTgt spid="16"/>
+                                        </p:tgtEl>
+                                        <p:attrNameLst>
+                                          <p:attrName>ppt_x</p:attrName>
+                                          <p:attrName>ppt_y</p:attrName>
+                                        </p:attrNameLst>
+                                      </p:cBhvr>
+                                    </p:animMotion>
+                                  </p:childTnLst>
+                                </p:cTn>
+                              </p:par>
+                              <p:par>
+                                <p:cTn id="11" presetID="0" presetClass="path" presetSubtype="0" accel="50000" decel="50000" fill="hold" grpId="0" nodeType="withEffect">
+                                  <p:stCondLst>
+                                    <p:cond delay="0"/>
+                                  </p:stCondLst>
+                                  <p:childTnLst>
+                                    <p:animMotion origin="layout" path="M 0 0 L 0.43924 0 " pathEditMode="relative" ptsTypes="AA">
+                                      <p:cBhvr>
+                                        <p:cTn id="12" dur="2000" fill="hold"/>
+                                        <p:tgtEl>
+                                          <p:spTgt spid="14"/>
+                                        </p:tgtEl>
+                                        <p:attrNameLst>
+                                          <p:attrName>ppt_x</p:attrName>
+                                          <p:attrName>ppt_y</p:attrName>
+                                        </p:attrNameLst>
+                                      </p:cBhvr>
+                                    </p:animMotion>
+                                  </p:childTnLst>
+                                </p:cTn>
+                              </p:par>
+                              <p:par>
+                                <p:cTn id="13" presetID="0" presetClass="path" presetSubtype="0" accel="50000" decel="50000" fill="hold" grpId="0" nodeType="withEffect">
+                                  <p:stCondLst>
+                                    <p:cond delay="0"/>
+                                  </p:stCondLst>
+                                  <p:childTnLst>
+                                    <p:animMotion origin="layout" path="M 0 0 L 0.43924 0 " pathEditMode="relative" ptsTypes="AA">
+                                      <p:cBhvr>
+                                        <p:cTn id="14" dur="2000" fill="hold"/>
+                                        <p:tgtEl>
+                                          <p:spTgt spid="15"/>
+                                        </p:tgtEl>
+                                        <p:attrNameLst>
+                                          <p:attrName>ppt_x</p:attrName>
+                                          <p:attrName>ppt_y</p:attrName>
+                                        </p:attrNameLst>
+                                      </p:cBhvr>
+                                    </p:animMotion>
+                                  </p:childTnLst>
+                                </p:cTn>
+                              </p:par>
+                              <p:par>
+                                <p:cTn id="15" presetID="10" presetClass="entr" presetSubtype="0" fill="hold" grpId="0" nodeType="withEffect">
+                                  <p:stCondLst>
+                                    <p:cond delay="0"/>
+                                  </p:stCondLst>
+                                  <p:childTnLst>
+                                    <p:set>
+                                      <p:cBhvr>
+                                        <p:cTn id="16" dur="1" fill="hold">
+                                          <p:stCondLst>
+                                            <p:cond delay="0"/>
+                                          </p:stCondLst>
+                                        </p:cTn>
+                                        <p:tgtEl>
+                                          <p:spTgt spid="25"/>
+                                        </p:tgtEl>
+                                        <p:attrNameLst>
+                                          <p:attrName>style.visibility</p:attrName>
+                                        </p:attrNameLst>
+                                      </p:cBhvr>
+                                      <p:to>
+                                        <p:strVal val="visible"/>
+                                      </p:to>
+                                    </p:set>
+                                    <p:animEffect transition="in" filter="fade">
+                                      <p:cBhvr>
+                                        <p:cTn id="17" dur="500"/>
+                                        <p:tgtEl>
+                                          <p:spTgt spid="25"/>
+                                        </p:tgtEl>
+                                      </p:cBhvr>
+                                    </p:animEffect>
+                                  </p:childTnLst>
+                                </p:cTn>
+                              </p:par>
+                            </p:childTnLst>
+                          </p:cTn>
+                        </p:par>
+                      </p:childTnLst>
+                    </p:cTn>
+                  </p:par>
+                  <p:par>
+                    <p:cTn id="18" fill="hold">
+                      <p:stCondLst>
+                        <p:cond delay="indefinite"/>
+                      </p:stCondLst>
+                      <p:childTnLst>
+                        <p:par>
+                          <p:cTn id="19" fill="hold">
+                            <p:stCondLst>
+                              <p:cond delay="0"/>
+                            </p:stCondLst>
+                            <p:childTnLst>
+                              <p:par>
+                                <p:cTn id="20" presetID="2" presetClass="entr" presetSubtype="1" fill="hold" grpId="0" nodeType="clickEffect">
+                                  <p:stCondLst>
+                                    <p:cond delay="0"/>
+                                  </p:stCondLst>
+                                  <p:childTnLst>
+                                    <p:set>
+                                      <p:cBhvr>
+                                        <p:cTn id="21" dur="1" fill="hold">
+                                          <p:stCondLst>
+                                            <p:cond delay="0"/>
+                                          </p:stCondLst>
+                                        </p:cTn>
+                                        <p:tgtEl>
+                                          <p:spTgt spid="30"/>
+                                        </p:tgtEl>
+                                        <p:attrNameLst>
+                                          <p:attrName>style.visibility</p:attrName>
+                                        </p:attrNameLst>
+                                      </p:cBhvr>
+                                      <p:to>
+                                        <p:strVal val="visible"/>
+                                      </p:to>
+                                    </p:set>
+                                    <p:anim calcmode="lin" valueType="num">
+                                      <p:cBhvr additive="base">
+                                        <p:cTn id="22" dur="500" fill="hold"/>
+                                        <p:tgtEl>
+                                          <p:spTgt spid="30"/>
+                                        </p:tgtEl>
+                                        <p:attrNameLst>
+                                          <p:attrName>ppt_x</p:attrName>
+                                        </p:attrNameLst>
+                                      </p:cBhvr>
+                                      <p:tavLst>
+                                        <p:tav tm="0">
+                                          <p:val>
+                                            <p:strVal val="#ppt_x"/>
+                                          </p:val>
+                                        </p:tav>
+                                        <p:tav tm="100000">
+                                          <p:val>
+                                            <p:strVal val="#ppt_x"/>
+                                          </p:val>
+                                        </p:tav>
+                                      </p:tavLst>
+                                    </p:anim>
+                                    <p:anim calcmode="lin" valueType="num">
+                                      <p:cBhvr additive="base">
+                                        <p:cTn id="23" dur="500" fill="hold"/>
+                                        <p:tgtEl>
+                                          <p:spTgt spid="30"/>
+                                        </p:tgtEl>
+                                        <p:attrNameLst>
+                                          <p:attrName>ppt_y</p:attrName>
+                                        </p:attrNameLst>
+                                      </p:cBhvr>
+                                      <p:tavLst>
+                                        <p:tav tm="0">
+                                          <p:val>
+                                            <p:strVal val="0-#ppt_h/2"/>
+                                          </p:val>
+                                        </p:tav>
+                                        <p:tav tm="100000">
+                                          <p:val>
+                                            <p:strVal val="#ppt_y"/>
+                                          </p:val>
+                                        </p:tav>
+                                      </p:tavLst>
+                                    </p:anim>
+                                  </p:childTnLst>
+                                </p:cTn>
+                              </p:par>
+                              <p:par>
+                                <p:cTn id="24" presetID="2" presetClass="entr" presetSubtype="1" fill="hold" grpId="0" nodeType="withEffect">
+                                  <p:stCondLst>
+                                    <p:cond delay="0"/>
+                                  </p:stCondLst>
+                                  <p:childTnLst>
+                                    <p:set>
+                                      <p:cBhvr>
+                                        <p:cTn id="25" dur="1" fill="hold">
+                                          <p:stCondLst>
+                                            <p:cond delay="0"/>
+                                          </p:stCondLst>
+                                        </p:cTn>
+                                        <p:tgtEl>
+                                          <p:spTgt spid="31"/>
+                                        </p:tgtEl>
+                                        <p:attrNameLst>
+                                          <p:attrName>style.visibility</p:attrName>
+                                        </p:attrNameLst>
+                                      </p:cBhvr>
+                                      <p:to>
+                                        <p:strVal val="visible"/>
+                                      </p:to>
+                                    </p:set>
+                                    <p:anim calcmode="lin" valueType="num">
+                                      <p:cBhvr additive="base">
+                                        <p:cTn id="26" dur="500" fill="hold"/>
+                                        <p:tgtEl>
+                                          <p:spTgt spid="31"/>
+                                        </p:tgtEl>
+                                        <p:attrNameLst>
+                                          <p:attrName>ppt_x</p:attrName>
+                                        </p:attrNameLst>
+                                      </p:cBhvr>
+                                      <p:tavLst>
+                                        <p:tav tm="0">
+                                          <p:val>
+                                            <p:strVal val="#ppt_x"/>
+                                          </p:val>
+                                        </p:tav>
+                                        <p:tav tm="100000">
+                                          <p:val>
+                                            <p:strVal val="#ppt_x"/>
+                                          </p:val>
+                                        </p:tav>
+                                      </p:tavLst>
+                                    </p:anim>
+                                    <p:anim calcmode="lin" valueType="num">
+                                      <p:cBhvr additive="base">
+                                        <p:cTn id="27" dur="500" fill="hold"/>
+                                        <p:tgtEl>
+                                          <p:spTgt spid="31"/>
+                                        </p:tgtEl>
+                                        <p:attrNameLst>
+                                          <p:attrName>ppt_y</p:attrName>
+                                        </p:attrNameLst>
+                                      </p:cBhvr>
+                                      <p:tavLst>
+                                        <p:tav tm="0">
+                                          <p:val>
+                                            <p:strVal val="0-#ppt_h/2"/>
+                                          </p:val>
+                                        </p:tav>
+                                        <p:tav tm="100000">
+                                          <p:val>
+                                            <p:strVal val="#ppt_y"/>
+                                          </p:val>
+                                        </p:tav>
+                                      </p:tavLst>
+                                    </p:anim>
+                                  </p:childTnLst>
+                                </p:cTn>
+                              </p:par>
+                            </p:childTnLst>
+                          </p:cTn>
+                        </p:par>
+                      </p:childTnLst>
+                    </p:cTn>
+                  </p:par>
+                  <p:par>
+                    <p:cTn id="28" fill="hold">
+                      <p:stCondLst>
+                        <p:cond delay="indefinite"/>
+                      </p:stCondLst>
+                      <p:childTnLst>
+                        <p:par>
+                          <p:cTn id="29" fill="hold">
+                            <p:stCondLst>
+                              <p:cond delay="0"/>
+                            </p:stCondLst>
+                            <p:childTnLst>
+                              <p:par>
+                                <p:cTn id="30" presetID="2" presetClass="exit" presetSubtype="1" fill="hold" grpId="1" nodeType="clickEffect">
+                                  <p:stCondLst>
+                                    <p:cond delay="0"/>
+                                  </p:stCondLst>
+                                  <p:childTnLst>
+                                    <p:anim calcmode="lin" valueType="num">
+                                      <p:cBhvr additive="base">
+                                        <p:cTn id="31" dur="500"/>
+                                        <p:tgtEl>
+                                          <p:spTgt spid="30"/>
+                                        </p:tgtEl>
+                                        <p:attrNameLst>
+                                          <p:attrName>ppt_x</p:attrName>
+                                        </p:attrNameLst>
+                                      </p:cBhvr>
+                                      <p:tavLst>
+                                        <p:tav tm="0">
+                                          <p:val>
+                                            <p:strVal val="ppt_x"/>
+                                          </p:val>
+                                        </p:tav>
+                                        <p:tav tm="100000">
+                                          <p:val>
+                                            <p:strVal val="ppt_x"/>
+                                          </p:val>
+                                        </p:tav>
+                                      </p:tavLst>
+                                    </p:anim>
+                                    <p:anim calcmode="lin" valueType="num">
+                                      <p:cBhvr additive="base">
+                                        <p:cTn id="32" dur="500"/>
+                                        <p:tgtEl>
+                                          <p:spTgt spid="30"/>
+                                        </p:tgtEl>
+                                        <p:attrNameLst>
+                                          <p:attrName>ppt_y</p:attrName>
+                                        </p:attrNameLst>
+                                      </p:cBhvr>
+                                      <p:tavLst>
+                                        <p:tav tm="0">
+                                          <p:val>
+                                            <p:strVal val="ppt_y"/>
+                                          </p:val>
+                                        </p:tav>
+                                        <p:tav tm="100000">
+                                          <p:val>
+                                            <p:strVal val="0-ppt_h/2"/>
+                                          </p:val>
+                                        </p:tav>
+                                      </p:tavLst>
+                                    </p:anim>
+                                    <p:set>
+                                      <p:cBhvr>
+                                        <p:cTn id="33" dur="1" fill="hold">
+                                          <p:stCondLst>
+                                            <p:cond delay="499"/>
+                                          </p:stCondLst>
+                                        </p:cTn>
+                                        <p:tgtEl>
+                                          <p:spTgt spid="30"/>
+                                        </p:tgtEl>
+                                        <p:attrNameLst>
+                                          <p:attrName>style.visibility</p:attrName>
+                                        </p:attrNameLst>
+                                      </p:cBhvr>
+                                      <p:to>
+                                        <p:strVal val="hidden"/>
+                                      </p:to>
+                                    </p:set>
+                                  </p:childTnLst>
+                                </p:cTn>
+                              </p:par>
+                              <p:par>
+                                <p:cTn id="34" presetID="2" presetClass="exit" presetSubtype="1" fill="hold" grpId="1" nodeType="withEffect">
+                                  <p:stCondLst>
+                                    <p:cond delay="0"/>
+                                  </p:stCondLst>
+                                  <p:childTnLst>
+                                    <p:anim calcmode="lin" valueType="num">
+                                      <p:cBhvr additive="base">
+                                        <p:cTn id="35" dur="500"/>
+                                        <p:tgtEl>
+                                          <p:spTgt spid="31"/>
+                                        </p:tgtEl>
+                                        <p:attrNameLst>
+                                          <p:attrName>ppt_x</p:attrName>
+                                        </p:attrNameLst>
+                                      </p:cBhvr>
+                                      <p:tavLst>
+                                        <p:tav tm="0">
+                                          <p:val>
+                                            <p:strVal val="ppt_x"/>
+                                          </p:val>
+                                        </p:tav>
+                                        <p:tav tm="100000">
+                                          <p:val>
+                                            <p:strVal val="ppt_x"/>
+                                          </p:val>
+                                        </p:tav>
+                                      </p:tavLst>
+                                    </p:anim>
+                                    <p:anim calcmode="lin" valueType="num">
+                                      <p:cBhvr additive="base">
+                                        <p:cTn id="36" dur="500"/>
+                                        <p:tgtEl>
+                                          <p:spTgt spid="31"/>
+                                        </p:tgtEl>
+                                        <p:attrNameLst>
+                                          <p:attrName>ppt_y</p:attrName>
+                                        </p:attrNameLst>
+                                      </p:cBhvr>
+                                      <p:tavLst>
+                                        <p:tav tm="0">
+                                          <p:val>
+                                            <p:strVal val="ppt_y"/>
+                                          </p:val>
+                                        </p:tav>
+                                        <p:tav tm="100000">
+                                          <p:val>
+                                            <p:strVal val="0-ppt_h/2"/>
+                                          </p:val>
+                                        </p:tav>
+                                      </p:tavLst>
+                                    </p:anim>
+                                    <p:set>
+                                      <p:cBhvr>
+                                        <p:cTn id="37" dur="1" fill="hold">
+                                          <p:stCondLst>
+                                            <p:cond delay="499"/>
+                                          </p:stCondLst>
+                                        </p:cTn>
+                                        <p:tgtEl>
+                                          <p:spTgt spid="31"/>
+                                        </p:tgtEl>
+                                        <p:attrNameLst>
+                                          <p:attrName>style.visibility</p:attrName>
+                                        </p:attrNameLst>
+                                      </p:cBhvr>
+                                      <p:to>
+                                        <p:strVal val="hidden"/>
+                                      </p:to>
+                                    </p:set>
+                                  </p:childTnLst>
+                                </p:cTn>
+                              </p:par>
+                            </p:childTnLst>
+                          </p:cTn>
+                        </p:par>
+                      </p:childTnLst>
+                    </p:cTn>
+                  </p:par>
+                  <p:par>
+                    <p:cTn id="38" fill="hold">
+                      <p:stCondLst>
+                        <p:cond delay="indefinite"/>
+                      </p:stCondLst>
+                      <p:childTnLst>
+                        <p:par>
+                          <p:cTn id="39" fill="hold">
+                            <p:stCondLst>
+                              <p:cond delay="0"/>
+                            </p:stCondLst>
+                            <p:childTnLst>
+                              <p:par>
+                                <p:cTn id="40" presetID="50" presetClass="path" presetSubtype="0" accel="50000" decel="50000" fill="hold" nodeType="clickEffect">
+                                  <p:stCondLst>
+                                    <p:cond delay="0"/>
+                                  </p:stCondLst>
+                                  <p:childTnLst>
+                                    <p:animMotion origin="layout" path="M -2.22222E-6 -4.44444E-6 L 0.21788 -4.44444E-6 C 0.31563 -4.44444E-6 0.43594 -0.0456 0.43594 -0.08217 L 0.43594 -0.16365 " pathEditMode="relative" rAng="0" ptsTypes="FfFF">
+                                      <p:cBhvr>
+                                        <p:cTn id="41" dur="2000" fill="hold"/>
+                                        <p:tgtEl>
+                                          <p:spTgt spid="11"/>
+                                        </p:tgtEl>
+                                        <p:attrNameLst>
+                                          <p:attrName>ppt_x</p:attrName>
+                                          <p:attrName>ppt_y</p:attrName>
+                                        </p:attrNameLst>
+                                      </p:cBhvr>
+                                      <p:rCtr x="21788" y="-8194"/>
+                                    </p:animMotion>
+                                  </p:childTnLst>
+                                </p:cTn>
+                              </p:par>
+                              <p:par>
+                                <p:cTn id="42" presetID="2" presetClass="entr" presetSubtype="4" fill="hold" nodeType="withEffect">
+                                  <p:stCondLst>
+                                    <p:cond delay="0"/>
+                                  </p:stCondLst>
+                                  <p:childTnLst>
+                                    <p:set>
+                                      <p:cBhvr>
+                                        <p:cTn id="43" dur="1" fill="hold">
+                                          <p:stCondLst>
+                                            <p:cond delay="0"/>
+                                          </p:stCondLst>
+                                        </p:cTn>
+                                        <p:tgtEl>
+                                          <p:spTgt spid="24"/>
+                                        </p:tgtEl>
+                                        <p:attrNameLst>
+                                          <p:attrName>style.visibility</p:attrName>
+                                        </p:attrNameLst>
+                                      </p:cBhvr>
+                                      <p:to>
+                                        <p:strVal val="visible"/>
+                                      </p:to>
+                                    </p:set>
+                                    <p:anim calcmode="lin" valueType="num">
+                                      <p:cBhvr additive="base">
+                                        <p:cTn id="44" dur="500" fill="hold"/>
+                                        <p:tgtEl>
+                                          <p:spTgt spid="24"/>
+                                        </p:tgtEl>
+                                        <p:attrNameLst>
+                                          <p:attrName>ppt_x</p:attrName>
+                                        </p:attrNameLst>
+                                      </p:cBhvr>
+                                      <p:tavLst>
+                                        <p:tav tm="0">
+                                          <p:val>
+                                            <p:strVal val="#ppt_x"/>
+                                          </p:val>
+                                        </p:tav>
+                                        <p:tav tm="100000">
+                                          <p:val>
+                                            <p:strVal val="#ppt_x"/>
+                                          </p:val>
+                                        </p:tav>
+                                      </p:tavLst>
+                                    </p:anim>
+                                    <p:anim calcmode="lin" valueType="num">
+                                      <p:cBhvr additive="base">
+                                        <p:cTn id="45" dur="500" fill="hold"/>
+                                        <p:tgtEl>
+                                          <p:spTgt spid="24"/>
+                                        </p:tgtEl>
+                                        <p:attrNameLst>
+                                          <p:attrName>ppt_y</p:attrName>
+                                        </p:attrNameLst>
+                                      </p:cBhvr>
+                                      <p:tavLst>
+                                        <p:tav tm="0">
+                                          <p:val>
+                                            <p:strVal val="1+#ppt_h/2"/>
+                                          </p:val>
+                                        </p:tav>
+                                        <p:tav tm="100000">
+                                          <p:val>
+                                            <p:strVal val="#ppt_y"/>
+                                          </p:val>
+                                        </p:tav>
+                                      </p:tavLst>
+                                    </p:anim>
+                                  </p:childTnLst>
+                                </p:cTn>
+                              </p:par>
+                            </p:childTnLst>
+                          </p:cTn>
+                        </p:par>
+                      </p:childTnLst>
+                    </p:cTn>
+                  </p:par>
+                  <p:par>
+                    <p:cTn id="46" fill="hold">
+                      <p:stCondLst>
+                        <p:cond delay="indefinite"/>
+                      </p:stCondLst>
+                      <p:childTnLst>
+                        <p:par>
+                          <p:cTn id="47" fill="hold">
+                            <p:stCondLst>
+                              <p:cond delay="0"/>
+                            </p:stCondLst>
+                            <p:childTnLst>
+                              <p:par>
+                                <p:cTn id="48" presetID="2" presetClass="entr" presetSubtype="4" fill="hold" grpId="0" nodeType="clickEffect">
+                                  <p:stCondLst>
+                                    <p:cond delay="0"/>
+                                  </p:stCondLst>
+                                  <p:childTnLst>
+                                    <p:set>
+                                      <p:cBhvr>
+                                        <p:cTn id="49" dur="1" fill="hold">
+                                          <p:stCondLst>
+                                            <p:cond delay="0"/>
+                                          </p:stCondLst>
+                                        </p:cTn>
+                                        <p:tgtEl>
+                                          <p:spTgt spid="22"/>
+                                        </p:tgtEl>
+                                        <p:attrNameLst>
+                                          <p:attrName>style.visibility</p:attrName>
+                                        </p:attrNameLst>
+                                      </p:cBhvr>
+                                      <p:to>
+                                        <p:strVal val="visible"/>
+                                      </p:to>
+                                    </p:set>
+                                    <p:anim calcmode="lin" valueType="num">
+                                      <p:cBhvr additive="base">
+                                        <p:cTn id="50" dur="500" fill="hold"/>
+                                        <p:tgtEl>
+                                          <p:spTgt spid="22"/>
+                                        </p:tgtEl>
+                                        <p:attrNameLst>
+                                          <p:attrName>ppt_x</p:attrName>
+                                        </p:attrNameLst>
+                                      </p:cBhvr>
+                                      <p:tavLst>
+                                        <p:tav tm="0">
+                                          <p:val>
+                                            <p:strVal val="#ppt_x"/>
+                                          </p:val>
+                                        </p:tav>
+                                        <p:tav tm="100000">
+                                          <p:val>
+                                            <p:strVal val="#ppt_x"/>
+                                          </p:val>
+                                        </p:tav>
+                                      </p:tavLst>
+                                    </p:anim>
+                                    <p:anim calcmode="lin" valueType="num">
+                                      <p:cBhvr additive="base">
+                                        <p:cTn id="51" dur="500" fill="hold"/>
+                                        <p:tgtEl>
+                                          <p:spTgt spid="22"/>
+                                        </p:tgtEl>
+                                        <p:attrNameLst>
+                                          <p:attrName>ppt_y</p:attrName>
+                                        </p:attrNameLst>
+                                      </p:cBhvr>
+                                      <p:tavLst>
+                                        <p:tav tm="0">
+                                          <p:val>
+                                            <p:strVal val="1+#ppt_h/2"/>
+                                          </p:val>
+                                        </p:tav>
+                                        <p:tav tm="100000">
+                                          <p:val>
+                                            <p:strVal val="#ppt_y"/>
+                                          </p:val>
+                                        </p:tav>
+                                      </p:tavLst>
+                                    </p:anim>
+                                  </p:childTnLst>
+                                </p:cTn>
+                              </p:par>
+                            </p:childTnLst>
+                          </p:cTn>
+                        </p:par>
+                      </p:childTnLst>
+                    </p:cTn>
+                  </p:par>
+                  <p:par>
+                    <p:cTn id="52" fill="hold">
+                      <p:stCondLst>
+                        <p:cond delay="indefinite"/>
+                      </p:stCondLst>
+                      <p:childTnLst>
+                        <p:par>
+                          <p:cTn id="53" fill="hold">
+                            <p:stCondLst>
+                              <p:cond delay="0"/>
+                            </p:stCondLst>
+                            <p:childTnLst>
+                              <p:par>
+                                <p:cTn id="54" presetID="2" presetClass="entr" presetSubtype="4" fill="hold" grpId="0" nodeType="clickEffect">
+                                  <p:stCondLst>
+                                    <p:cond delay="0"/>
+                                  </p:stCondLst>
+                                  <p:childTnLst>
+                                    <p:set>
+                                      <p:cBhvr>
+                                        <p:cTn id="55" dur="1" fill="hold">
+                                          <p:stCondLst>
+                                            <p:cond delay="0"/>
+                                          </p:stCondLst>
+                                        </p:cTn>
+                                        <p:tgtEl>
+                                          <p:spTgt spid="19"/>
+                                        </p:tgtEl>
+                                        <p:attrNameLst>
+                                          <p:attrName>style.visibility</p:attrName>
+                                        </p:attrNameLst>
+                                      </p:cBhvr>
+                                      <p:to>
+                                        <p:strVal val="visible"/>
+                                      </p:to>
+                                    </p:set>
+                                    <p:anim calcmode="lin" valueType="num">
+                                      <p:cBhvr additive="base">
+                                        <p:cTn id="56" dur="500" fill="hold"/>
+                                        <p:tgtEl>
+                                          <p:spTgt spid="19"/>
+                                        </p:tgtEl>
+                                        <p:attrNameLst>
+                                          <p:attrName>ppt_x</p:attrName>
+                                        </p:attrNameLst>
+                                      </p:cBhvr>
+                                      <p:tavLst>
+                                        <p:tav tm="0">
+                                          <p:val>
+                                            <p:strVal val="#ppt_x"/>
+                                          </p:val>
+                                        </p:tav>
+                                        <p:tav tm="100000">
+                                          <p:val>
+                                            <p:strVal val="#ppt_x"/>
+                                          </p:val>
+                                        </p:tav>
+                                      </p:tavLst>
+                                    </p:anim>
+                                    <p:anim calcmode="lin" valueType="num">
+                                      <p:cBhvr additive="base">
+                                        <p:cTn id="57" dur="500" fill="hold"/>
+                                        <p:tgtEl>
+                                          <p:spTgt spid="19"/>
+                                        </p:tgtEl>
+                                        <p:attrNameLst>
+                                          <p:attrName>ppt_y</p:attrName>
+                                        </p:attrNameLst>
+                                      </p:cBhvr>
+                                      <p:tavLst>
+                                        <p:tav tm="0">
+                                          <p:val>
+                                            <p:strVal val="1+#ppt_h/2"/>
+                                          </p:val>
+                                        </p:tav>
+                                        <p:tav tm="100000">
+                                          <p:val>
+                                            <p:strVal val="#ppt_y"/>
+                                          </p:val>
+                                        </p:tav>
+                                      </p:tavLst>
+                                    </p:anim>
+                                  </p:childTnLst>
+                                </p:cTn>
+                              </p:par>
+                            </p:childTnLst>
+                          </p:cTn>
+                        </p:par>
+                      </p:childTnLst>
+                    </p:cTn>
+                  </p:par>
+                  <p:par>
+                    <p:cTn id="58" fill="hold">
+                      <p:stCondLst>
+                        <p:cond delay="indefinite"/>
+                      </p:stCondLst>
+                      <p:childTnLst>
+                        <p:par>
+                          <p:cTn id="59" fill="hold">
+                            <p:stCondLst>
+                              <p:cond delay="0"/>
+                            </p:stCondLst>
+                            <p:childTnLst>
+                              <p:par>
+                                <p:cTn id="60" presetID="2" presetClass="exit" presetSubtype="8" fill="hold" grpId="0" nodeType="clickEffect">
+                                  <p:stCondLst>
+                                    <p:cond delay="0"/>
+                                  </p:stCondLst>
+                                  <p:childTnLst>
+                                    <p:anim calcmode="lin" valueType="num">
+                                      <p:cBhvr additive="base">
+                                        <p:cTn id="61" dur="500"/>
+                                        <p:tgtEl>
+                                          <p:spTgt spid="8"/>
+                                        </p:tgtEl>
+                                        <p:attrNameLst>
+                                          <p:attrName>ppt_x</p:attrName>
+                                        </p:attrNameLst>
+                                      </p:cBhvr>
+                                      <p:tavLst>
+                                        <p:tav tm="0">
+                                          <p:val>
+                                            <p:strVal val="ppt_x"/>
+                                          </p:val>
+                                        </p:tav>
+                                        <p:tav tm="100000">
+                                          <p:val>
+                                            <p:strVal val="0-ppt_w/2"/>
+                                          </p:val>
+                                        </p:tav>
+                                      </p:tavLst>
+                                    </p:anim>
+                                    <p:anim calcmode="lin" valueType="num">
+                                      <p:cBhvr additive="base">
+                                        <p:cTn id="62" dur="500"/>
+                                        <p:tgtEl>
+                                          <p:spTgt spid="8"/>
+                                        </p:tgtEl>
+                                        <p:attrNameLst>
+                                          <p:attrName>ppt_y</p:attrName>
+                                        </p:attrNameLst>
+                                      </p:cBhvr>
+                                      <p:tavLst>
+                                        <p:tav tm="0">
+                                          <p:val>
+                                            <p:strVal val="ppt_y"/>
+                                          </p:val>
+                                        </p:tav>
+                                        <p:tav tm="100000">
+                                          <p:val>
+                                            <p:strVal val="ppt_y"/>
+                                          </p:val>
+                                        </p:tav>
+                                      </p:tavLst>
+                                    </p:anim>
+                                    <p:set>
+                                      <p:cBhvr>
+                                        <p:cTn id="63" dur="1" fill="hold">
+                                          <p:stCondLst>
+                                            <p:cond delay="499"/>
+                                          </p:stCondLst>
+                                        </p:cTn>
+                                        <p:tgtEl>
+                                          <p:spTgt spid="8"/>
+                                        </p:tgtEl>
+                                        <p:attrNameLst>
+                                          <p:attrName>style.visibility</p:attrName>
+                                        </p:attrNameLst>
+                                      </p:cBhvr>
+                                      <p:to>
+                                        <p:strVal val="hidden"/>
+                                      </p:to>
+                                    </p:set>
+                                  </p:childTnLst>
+                                </p:cTn>
+                              </p:par>
+                            </p:childTnLst>
+                          </p:cTn>
+                        </p:par>
+                      </p:childTnLst>
+                    </p:cTn>
+                  </p:par>
+                  <p:par>
+                    <p:cTn id="64" fill="hold">
+                      <p:stCondLst>
+                        <p:cond delay="indefinite"/>
+                      </p:stCondLst>
+                      <p:childTnLst>
+                        <p:par>
+                          <p:cTn id="65" fill="hold">
+                            <p:stCondLst>
+                              <p:cond delay="0"/>
+                            </p:stCondLst>
+                            <p:childTnLst>
+                              <p:par>
+                                <p:cTn id="66" presetID="2" presetClass="entr" presetSubtype="4" fill="hold" grpId="0" nodeType="clickEffect">
+                                  <p:stCondLst>
+                                    <p:cond delay="0"/>
+                                  </p:stCondLst>
+                                  <p:childTnLst>
+                                    <p:set>
+                                      <p:cBhvr>
+                                        <p:cTn id="67" dur="1" fill="hold">
+                                          <p:stCondLst>
+                                            <p:cond delay="0"/>
+                                          </p:stCondLst>
+                                        </p:cTn>
+                                        <p:tgtEl>
+                                          <p:spTgt spid="21"/>
+                                        </p:tgtEl>
+                                        <p:attrNameLst>
+                                          <p:attrName>style.visibility</p:attrName>
+                                        </p:attrNameLst>
+                                      </p:cBhvr>
+                                      <p:to>
+                                        <p:strVal val="visible"/>
+                                      </p:to>
+                                    </p:set>
+                                    <p:anim calcmode="lin" valueType="num">
+                                      <p:cBhvr additive="base">
+                                        <p:cTn id="68" dur="500" fill="hold"/>
+                                        <p:tgtEl>
+                                          <p:spTgt spid="21"/>
+                                        </p:tgtEl>
+                                        <p:attrNameLst>
+                                          <p:attrName>ppt_x</p:attrName>
+                                        </p:attrNameLst>
+                                      </p:cBhvr>
+                                      <p:tavLst>
+                                        <p:tav tm="0">
+                                          <p:val>
+                                            <p:strVal val="#ppt_x"/>
+                                          </p:val>
+                                        </p:tav>
+                                        <p:tav tm="100000">
+                                          <p:val>
+                                            <p:strVal val="#ppt_x"/>
+                                          </p:val>
+                                        </p:tav>
+                                      </p:tavLst>
+                                    </p:anim>
+                                    <p:anim calcmode="lin" valueType="num">
+                                      <p:cBhvr additive="base">
+                                        <p:cTn id="69" dur="500" fill="hold"/>
+                                        <p:tgtEl>
+                                          <p:spTgt spid="21"/>
+                                        </p:tgtEl>
+                                        <p:attrNameLst>
+                                          <p:attrName>ppt_y</p:attrName>
+                                        </p:attrNameLst>
+                                      </p:cBhvr>
+                                      <p:tavLst>
+                                        <p:tav tm="0">
+                                          <p:val>
+                                            <p:strVal val="1+#ppt_h/2"/>
+                                          </p:val>
+                                        </p:tav>
+                                        <p:tav tm="100000">
+                                          <p:val>
+                                            <p:strVal val="#ppt_y"/>
+                                          </p:val>
+                                        </p:tav>
+                                      </p:tavLst>
+                                    </p:anim>
+                                  </p:childTnLst>
+                                </p:cTn>
+                              </p:par>
+                            </p:childTnLst>
+                          </p:cTn>
+                        </p:par>
+                      </p:childTnLst>
+                    </p:cTn>
+                  </p:par>
+                  <p:par>
+                    <p:cTn id="70" fill="hold">
+                      <p:stCondLst>
+                        <p:cond delay="indefinite"/>
+                      </p:stCondLst>
+                      <p:childTnLst>
+                        <p:par>
+                          <p:cTn id="71" fill="hold">
+                            <p:stCondLst>
+                              <p:cond delay="0"/>
+                            </p:stCondLst>
+                            <p:childTnLst>
+                              <p:par>
+                                <p:cTn id="72" presetID="2" presetClass="entr" presetSubtype="4" fill="hold" grpId="0" nodeType="clickEffect">
+                                  <p:stCondLst>
+                                    <p:cond delay="0"/>
+                                  </p:stCondLst>
+                                  <p:childTnLst>
+                                    <p:set>
+                                      <p:cBhvr>
+                                        <p:cTn id="73" dur="1" fill="hold">
+                                          <p:stCondLst>
+                                            <p:cond delay="0"/>
+                                          </p:stCondLst>
+                                        </p:cTn>
+                                        <p:tgtEl>
+                                          <p:spTgt spid="32"/>
+                                        </p:tgtEl>
+                                        <p:attrNameLst>
+                                          <p:attrName>style.visibility</p:attrName>
+                                        </p:attrNameLst>
+                                      </p:cBhvr>
+                                      <p:to>
+                                        <p:strVal val="visible"/>
+                                      </p:to>
+                                    </p:set>
+                                    <p:anim calcmode="lin" valueType="num">
+                                      <p:cBhvr additive="base">
+                                        <p:cTn id="74" dur="500" fill="hold"/>
+                                        <p:tgtEl>
+                                          <p:spTgt spid="32"/>
+                                        </p:tgtEl>
+                                        <p:attrNameLst>
+                                          <p:attrName>ppt_x</p:attrName>
+                                        </p:attrNameLst>
+                                      </p:cBhvr>
+                                      <p:tavLst>
+                                        <p:tav tm="0">
+                                          <p:val>
+                                            <p:strVal val="#ppt_x"/>
+                                          </p:val>
+                                        </p:tav>
+                                        <p:tav tm="100000">
+                                          <p:val>
+                                            <p:strVal val="#ppt_x"/>
+                                          </p:val>
+                                        </p:tav>
+                                      </p:tavLst>
+                                    </p:anim>
+                                    <p:anim calcmode="lin" valueType="num">
+                                      <p:cBhvr additive="base">
+                                        <p:cTn id="75" dur="500" fill="hold"/>
+                                        <p:tgtEl>
+                                          <p:spTgt spid="32"/>
+                                        </p:tgtEl>
+                                        <p:attrNameLst>
+                                          <p:attrName>ppt_y</p:attrName>
+                                        </p:attrNameLst>
+                                      </p:cBhvr>
+                                      <p:tavLst>
+                                        <p:tav tm="0">
+                                          <p:val>
+                                            <p:strVal val="1+#ppt_h/2"/>
+                                          </p:val>
+                                        </p:tav>
+                                        <p:tav tm="100000">
+                                          <p:val>
+                                            <p:strVal val="#ppt_y"/>
+                                          </p:val>
+                                        </p:tav>
+                                      </p:tavLst>
+                                    </p:anim>
+                                  </p:childTnLst>
+                                </p:cTn>
+                              </p:par>
+                            </p:childTnLst>
+                          </p:cTn>
+                        </p:par>
+                      </p:childTnLst>
+                    </p:cTn>
+                  </p:par>
+                  <p:par>
+                    <p:cTn id="76" fill="hold">
+                      <p:stCondLst>
+                        <p:cond delay="indefinite"/>
+                      </p:stCondLst>
+                      <p:childTnLst>
+                        <p:par>
+                          <p:cTn id="77" fill="hold">
+                            <p:stCondLst>
+                              <p:cond delay="0"/>
+                            </p:stCondLst>
+                            <p:childTnLst>
+                              <p:par>
+                                <p:cTn id="78" presetID="0" presetClass="path" presetSubtype="0" accel="50000" decel="50000" fill="hold" grpId="1" nodeType="clickEffect">
+                                  <p:stCondLst>
+                                    <p:cond delay="0"/>
+                                  </p:stCondLst>
+                                  <p:childTnLst>
+                                    <p:animMotion origin="layout" path="M 0.43923 -1.48148E-6 L 1.94444E-6 -1.48148E-6 " pathEditMode="relative" rAng="0" ptsTypes="AA">
+                                      <p:cBhvr>
+                                        <p:cTn id="79" dur="2000" fill="hold"/>
+                                        <p:tgtEl>
+                                          <p:spTgt spid="12"/>
+                                        </p:tgtEl>
+                                        <p:attrNameLst>
+                                          <p:attrName>ppt_x</p:attrName>
+                                          <p:attrName>ppt_y</p:attrName>
+                                        </p:attrNameLst>
+                                      </p:cBhvr>
+                                      <p:rCtr x="-21962" y="0"/>
+                                    </p:animMotion>
+                                  </p:childTnLst>
+                                </p:cTn>
+                              </p:par>
+                              <p:par>
+                                <p:cTn id="80" presetID="0" presetClass="path" presetSubtype="0" accel="50000" decel="50000" fill="hold" grpId="1" nodeType="withEffect">
+                                  <p:stCondLst>
+                                    <p:cond delay="0"/>
+                                  </p:stCondLst>
+                                  <p:childTnLst>
+                                    <p:animMotion origin="layout" path="M 0.43924 -1.48148E-6 L -3.88889E-6 -1.48148E-6 " pathEditMode="relative" rAng="0" ptsTypes="AA">
+                                      <p:cBhvr>
+                                        <p:cTn id="81" dur="2000" fill="hold"/>
+                                        <p:tgtEl>
+                                          <p:spTgt spid="13"/>
+                                        </p:tgtEl>
+                                        <p:attrNameLst>
+                                          <p:attrName>ppt_x</p:attrName>
+                                          <p:attrName>ppt_y</p:attrName>
+                                        </p:attrNameLst>
+                                      </p:cBhvr>
+                                      <p:rCtr x="-21962" y="0"/>
+                                    </p:animMotion>
+                                  </p:childTnLst>
+                                </p:cTn>
+                              </p:par>
+                              <p:par>
+                                <p:cTn id="82" presetID="0" presetClass="path" presetSubtype="0" accel="50000" decel="50000" fill="hold" grpId="1" nodeType="withEffect">
+                                  <p:stCondLst>
+                                    <p:cond delay="0"/>
+                                  </p:stCondLst>
+                                  <p:childTnLst>
+                                    <p:animMotion origin="layout" path="M 0.43924 1.85185E-6 L -3.88889E-6 1.85185E-6 " pathEditMode="relative" rAng="0" ptsTypes="AA">
+                                      <p:cBhvr>
+                                        <p:cTn id="83" dur="2000" fill="hold"/>
+                                        <p:tgtEl>
+                                          <p:spTgt spid="16"/>
+                                        </p:tgtEl>
+                                        <p:attrNameLst>
+                                          <p:attrName>ppt_x</p:attrName>
+                                          <p:attrName>ppt_y</p:attrName>
+                                        </p:attrNameLst>
+                                      </p:cBhvr>
+                                      <p:rCtr x="-21962" y="0"/>
+                                    </p:animMotion>
+                                  </p:childTnLst>
+                                </p:cTn>
+                              </p:par>
+                              <p:par>
+                                <p:cTn id="84" presetID="0" presetClass="path" presetSubtype="0" accel="50000" decel="50000" fill="hold" grpId="1" nodeType="withEffect">
+                                  <p:stCondLst>
+                                    <p:cond delay="0"/>
+                                  </p:stCondLst>
+                                  <p:childTnLst>
+                                    <p:animMotion origin="layout" path="M 0.43923 4.81481E-6 L 1.94444E-6 4.81481E-6 " pathEditMode="relative" rAng="0" ptsTypes="AA">
+                                      <p:cBhvr>
+                                        <p:cTn id="85" dur="2000" fill="hold"/>
+                                        <p:tgtEl>
+                                          <p:spTgt spid="14"/>
+                                        </p:tgtEl>
+                                        <p:attrNameLst>
+                                          <p:attrName>ppt_x</p:attrName>
+                                          <p:attrName>ppt_y</p:attrName>
+                                        </p:attrNameLst>
+                                      </p:cBhvr>
+                                      <p:rCtr x="-21962" y="0"/>
+                                    </p:animMotion>
+                                  </p:childTnLst>
+                                </p:cTn>
+                              </p:par>
+                              <p:par>
+                                <p:cTn id="86" presetID="0" presetClass="path" presetSubtype="0" accel="50000" decel="50000" fill="hold" grpId="1" nodeType="withEffect">
+                                  <p:stCondLst>
+                                    <p:cond delay="0"/>
+                                  </p:stCondLst>
+                                  <p:childTnLst>
+                                    <p:animMotion origin="layout" path="M 3.61111E-6 -3.7037E-7 L -0.43907 -0.00116 " pathEditMode="relative" rAng="0" ptsTypes="AA">
+                                      <p:cBhvr>
+                                        <p:cTn id="87" dur="2000" fill="hold"/>
+                                        <p:tgtEl>
+                                          <p:spTgt spid="21"/>
+                                        </p:tgtEl>
+                                        <p:attrNameLst>
+                                          <p:attrName>ppt_x</p:attrName>
+                                          <p:attrName>ppt_y</p:attrName>
+                                        </p:attrNameLst>
+                                      </p:cBhvr>
+                                      <p:rCtr x="-21962" y="-69"/>
+                                    </p:animMotion>
+                                  </p:childTnLst>
+                                </p:cTn>
+                              </p:par>
+                              <p:par>
+                                <p:cTn id="88" presetID="0" presetClass="path" presetSubtype="0" accel="50000" decel="50000" fill="hold" grpId="1" nodeType="withEffect">
+                                  <p:stCondLst>
+                                    <p:cond delay="0"/>
+                                  </p:stCondLst>
+                                  <p:childTnLst>
+                                    <p:animMotion origin="layout" path="M -3.33333E-6 -2.59259E-6 L -0.43871 -2.59259E-6 " pathEditMode="relative" rAng="0" ptsTypes="AA">
+                                      <p:cBhvr>
+                                        <p:cTn id="89" dur="2000" fill="hold"/>
+                                        <p:tgtEl>
+                                          <p:spTgt spid="22"/>
+                                        </p:tgtEl>
+                                        <p:attrNameLst>
+                                          <p:attrName>ppt_x</p:attrName>
+                                          <p:attrName>ppt_y</p:attrName>
+                                        </p:attrNameLst>
+                                      </p:cBhvr>
+                                      <p:rCtr x="-21944" y="0"/>
+                                    </p:animMotion>
+                                  </p:childTnLst>
+                                </p:cTn>
+                              </p:par>
+                              <p:par>
+                                <p:cTn id="90" presetID="0" presetClass="path" presetSubtype="0" accel="50000" decel="50000" fill="hold" grpId="1" nodeType="withEffect">
+                                  <p:stCondLst>
+                                    <p:cond delay="0"/>
+                                  </p:stCondLst>
+                                  <p:childTnLst>
+                                    <p:animMotion origin="layout" path="M 0.43923 -1.85185E-6 L 0.00034 -1.85185E-6 " pathEditMode="relative" rAng="0" ptsTypes="AA">
+                                      <p:cBhvr>
+                                        <p:cTn id="91" dur="2000" fill="hold"/>
+                                        <p:tgtEl>
+                                          <p:spTgt spid="15"/>
+                                        </p:tgtEl>
+                                        <p:attrNameLst>
+                                          <p:attrName>ppt_x</p:attrName>
+                                          <p:attrName>ppt_y</p:attrName>
+                                        </p:attrNameLst>
+                                      </p:cBhvr>
+                                      <p:rCtr x="-21944" y="0"/>
+                                    </p:animMotion>
+                                  </p:childTnLst>
+                                </p:cTn>
+                              </p:par>
+                              <p:par>
+                                <p:cTn id="92" presetID="9" presetClass="emph" presetSubtype="0" grpId="2" nodeType="withEffect">
+                                  <p:stCondLst>
+                                    <p:cond delay="0"/>
+                                  </p:stCondLst>
+                                  <p:childTnLst>
+                                    <p:set>
+                                      <p:cBhvr rctx="PPT">
+                                        <p:cTn id="93" dur="indefinite"/>
+                                        <p:tgtEl>
+                                          <p:spTgt spid="21"/>
+                                        </p:tgtEl>
+                                        <p:attrNameLst>
+                                          <p:attrName>style.opacity</p:attrName>
+                                        </p:attrNameLst>
+                                      </p:cBhvr>
+                                      <p:to>
+                                        <p:strVal val="0.5"/>
+                                      </p:to>
+                                    </p:set>
+                                    <p:animEffect filter="image" prLst="opacity: 0.5">
+                                      <p:cBhvr rctx="IE">
+                                        <p:cTn id="94" dur="indefinite"/>
+                                        <p:tgtEl>
+                                          <p:spTgt spid="21"/>
+                                        </p:tgtEl>
+                                      </p:cBhvr>
+                                    </p:animEffect>
+                                  </p:childTnLst>
+                                </p:cTn>
+                              </p:par>
+                              <p:par>
+                                <p:cTn id="95" presetID="9" presetClass="emph" presetSubtype="0" grpId="2" nodeType="withEffect">
+                                  <p:stCondLst>
+                                    <p:cond delay="0"/>
+                                  </p:stCondLst>
+                                  <p:childTnLst>
+                                    <p:set>
+                                      <p:cBhvr rctx="PPT">
+                                        <p:cTn id="96" dur="indefinite"/>
+                                        <p:tgtEl>
+                                          <p:spTgt spid="22"/>
+                                        </p:tgtEl>
+                                        <p:attrNameLst>
+                                          <p:attrName>style.opacity</p:attrName>
+                                        </p:attrNameLst>
+                                      </p:cBhvr>
+                                      <p:to>
+                                        <p:strVal val="0.5"/>
+                                      </p:to>
+                                    </p:set>
+                                    <p:animEffect filter="image" prLst="opacity: 0.5">
+                                      <p:cBhvr rctx="IE">
+                                        <p:cTn id="97" dur="indefinite"/>
+                                        <p:tgtEl>
+                                          <p:spTgt spid="22"/>
+                                        </p:tgtEl>
+                                      </p:cBhvr>
+                                    </p:animEffect>
+                                  </p:childTnLst>
+                                </p:cTn>
+                              </p:par>
+                              <p:par>
+                                <p:cTn id="98" presetID="9" presetClass="emph" presetSubtype="0" grpId="2" nodeType="withEffect">
+                                  <p:stCondLst>
+                                    <p:cond delay="0"/>
+                                  </p:stCondLst>
+                                  <p:childTnLst>
+                                    <p:set>
+                                      <p:cBhvr rctx="PPT">
+                                        <p:cTn id="99" dur="indefinite"/>
+                                        <p:tgtEl>
+                                          <p:spTgt spid="14"/>
+                                        </p:tgtEl>
+                                        <p:attrNameLst>
+                                          <p:attrName>style.opacity</p:attrName>
+                                        </p:attrNameLst>
+                                      </p:cBhvr>
+                                      <p:to>
+                                        <p:strVal val="0.5"/>
+                                      </p:to>
+                                    </p:set>
+                                    <p:animEffect filter="image" prLst="opacity: 0.5">
+                                      <p:cBhvr rctx="IE">
+                                        <p:cTn id="100" dur="indefinite"/>
+                                        <p:tgtEl>
+                                          <p:spTgt spid="14"/>
+                                        </p:tgtEl>
+                                      </p:cBhvr>
+                                    </p:animEffect>
+                                  </p:childTnLst>
+                                </p:cTn>
+                              </p:par>
+                              <p:par>
+                                <p:cTn id="101" presetID="9" presetClass="emph" presetSubtype="0" grpId="2" nodeType="withEffect">
+                                  <p:stCondLst>
+                                    <p:cond delay="0"/>
+                                  </p:stCondLst>
+                                  <p:childTnLst>
+                                    <p:set>
+                                      <p:cBhvr rctx="PPT">
+                                        <p:cTn id="102" dur="indefinite"/>
+                                        <p:tgtEl>
+                                          <p:spTgt spid="15"/>
+                                        </p:tgtEl>
+                                        <p:attrNameLst>
+                                          <p:attrName>style.opacity</p:attrName>
+                                        </p:attrNameLst>
+                                      </p:cBhvr>
+                                      <p:to>
+                                        <p:strVal val="0.5"/>
+                                      </p:to>
+                                    </p:set>
+                                    <p:animEffect filter="image" prLst="opacity: 0.5">
+                                      <p:cBhvr rctx="IE">
+                                        <p:cTn id="103" dur="indefinite"/>
+                                        <p:tgtEl>
+                                          <p:spTgt spid="15"/>
+                                        </p:tgtEl>
+                                      </p:cBhvr>
+                                    </p:animEffect>
+                                  </p:childTnLst>
+                                </p:cTn>
+                              </p:par>
+                              <p:par>
+                                <p:cTn id="104" presetID="9" presetClass="emph" presetSubtype="0" grpId="2" nodeType="withEffect">
+                                  <p:stCondLst>
+                                    <p:cond delay="0"/>
+                                  </p:stCondLst>
+                                  <p:childTnLst>
+                                    <p:set>
+                                      <p:cBhvr rctx="PPT">
+                                        <p:cTn id="105" dur="indefinite"/>
+                                        <p:tgtEl>
+                                          <p:spTgt spid="13"/>
+                                        </p:tgtEl>
+                                        <p:attrNameLst>
+                                          <p:attrName>style.opacity</p:attrName>
+                                        </p:attrNameLst>
+                                      </p:cBhvr>
+                                      <p:to>
+                                        <p:strVal val="0.5"/>
+                                      </p:to>
+                                    </p:set>
+                                    <p:animEffect filter="image" prLst="opacity: 0.5">
+                                      <p:cBhvr rctx="IE">
+                                        <p:cTn id="106" dur="indefinite"/>
+                                        <p:tgtEl>
+                                          <p:spTgt spid="13"/>
+                                        </p:tgtEl>
+                                      </p:cBhvr>
+                                    </p:animEffect>
+                                  </p:childTnLst>
+                                </p:cTn>
+                              </p:par>
+                              <p:par>
+                                <p:cTn id="107" presetID="9" presetClass="emph" presetSubtype="0" grpId="2" nodeType="withEffect">
+                                  <p:stCondLst>
+                                    <p:cond delay="0"/>
+                                  </p:stCondLst>
+                                  <p:childTnLst>
+                                    <p:set>
+                                      <p:cBhvr rctx="PPT">
+                                        <p:cTn id="108" dur="indefinite"/>
+                                        <p:tgtEl>
+                                          <p:spTgt spid="16"/>
+                                        </p:tgtEl>
+                                        <p:attrNameLst>
+                                          <p:attrName>style.opacity</p:attrName>
+                                        </p:attrNameLst>
+                                      </p:cBhvr>
+                                      <p:to>
+                                        <p:strVal val="0.5"/>
+                                      </p:to>
+                                    </p:set>
+                                    <p:animEffect filter="image" prLst="opacity: 0.5">
+                                      <p:cBhvr rctx="IE">
+                                        <p:cTn id="109" dur="indefinite"/>
+                                        <p:tgtEl>
+                                          <p:spTgt spid="16"/>
+                                        </p:tgtEl>
+                                      </p:cBhvr>
+                                    </p:animEffect>
+                                  </p:childTnLst>
+                                </p:cTn>
+                              </p:par>
+                              <p:par>
+                                <p:cTn id="110" presetID="9" presetClass="emph" presetSubtype="0" grpId="2" nodeType="withEffect">
+                                  <p:stCondLst>
+                                    <p:cond delay="0"/>
+                                  </p:stCondLst>
+                                  <p:childTnLst>
+                                    <p:set>
+                                      <p:cBhvr rctx="PPT">
+                                        <p:cTn id="111" dur="indefinite"/>
+                                        <p:tgtEl>
+                                          <p:spTgt spid="12"/>
+                                        </p:tgtEl>
+                                        <p:attrNameLst>
+                                          <p:attrName>style.opacity</p:attrName>
+                                        </p:attrNameLst>
+                                      </p:cBhvr>
+                                      <p:to>
+                                        <p:strVal val="0.5"/>
+                                      </p:to>
+                                    </p:set>
+                                    <p:animEffect filter="image" prLst="opacity: 0.5">
+                                      <p:cBhvr rctx="IE">
+                                        <p:cTn id="112" dur="indefinite"/>
+                                        <p:tgtEl>
+                                          <p:spTgt spid="12"/>
+                                        </p:tgtEl>
+                                      </p:cBhvr>
+                                    </p:animEffect>
+                                  </p:childTnLst>
+                                </p:cTn>
+                              </p:par>
+                            </p:childTnLst>
+                          </p:cTn>
+                        </p:par>
+                      </p:childTnLst>
+                    </p:cTn>
+                  </p:par>
+                </p:childTnLst>
+              </p:cTn>
+              <p:prevCondLst>
+                <p:cond evt="onPrev" delay="0">
+                  <p:tgtEl>
+                    <p:sldTgt/>
+                  </p:tgtEl>
+                </p:cond>
+              </p:prevCondLst>
+              <p:nextCondLst>
+                <p:cond evt="onNext" delay="0">
+                  <p:tgtEl>
+                    <p:sldTgt/>
+                  </p:tgtEl>
+                </p:cond>
+              </p:nextCondLst>
+            </p:seq>
+          </p:childTnLst>
+        </p:cTn>
+      </p:par>
+    </p:tnLst>
+    <p:bldLst>
+      <p:bldP spid="25" grpId="0" animBg="1"/>
+      <p:bldP spid="8" grpId="0" animBg="1"/>
+      <p:bldP spid="12" grpId="0" animBg="1"/>
+      <p:bldP spid="12" grpId="1" animBg="1"/>
+      <p:bldP spid="12" grpId="2" animBg="1"/>
+      <p:bldP spid="13" grpId="0" animBg="1"/>
+      <p:bldP spid="13" grpId="1" animBg="1"/>
+      <p:bldP spid="13" grpId="2" animBg="1"/>
+      <p:bldP spid="14" grpId="0" animBg="1"/>
+      <p:bldP spid="14" grpId="1" animBg="1"/>
+      <p:bldP spid="14" grpId="2" animBg="1"/>
+      <p:bldP spid="15" grpId="0" animBg="1"/>
+      <p:bldP spid="15" grpId="1" animBg="1"/>
+      <p:bldP spid="15" grpId="2" animBg="1"/>
+      <p:bldP spid="16" grpId="0" animBg="1"/>
+      <p:bldP spid="16" grpId="1" animBg="1"/>
+      <p:bldP spid="16" grpId="2" animBg="1"/>
+      <p:bldP spid="19" grpId="0" animBg="1"/>
+      <p:bldP spid="21" grpId="0" animBg="1"/>
+      <p:bldP spid="21" grpId="1" animBg="1"/>
+      <p:bldP spid="21" grpId="2" animBg="1"/>
+      <p:bldP spid="22" grpId="0" animBg="1"/>
+      <p:bldP spid="22" grpId="1" animBg="1"/>
+      <p:bldP spid="22" grpId="2" animBg="1"/>
+      <p:bldP spid="30" grpId="0"/>
+      <p:bldP spid="30" grpId="1"/>
+      <p:bldP spid="31" grpId="0"/>
+      <p:bldP spid="31" grpId="1"/>
+      <p:bldP spid="32" grpId="0" animBg="1"/>
+    </p:bldLst>
+  </p:timing>
+</p:sld>
+</file>
+
+<file path=ppt/slides/slide5.xml><?xml version="1.0" encoding="utf-8"?>
 <p:sld xmlns:a="http://schemas.openxmlformats.org/drawingml/2006/main" xmlns:r="http://schemas.openxmlformats.org/officeDocument/2006/relationships" xmlns:p="http://schemas.openxmlformats.org/presentationml/2006/main">
   <p:cSld>
     <p:spTree>
@@ -12115,7 +14697,7 @@
 </p:sld>
 </file>
 
-<file path=ppt/slides/slide5.xml><?xml version="1.0" encoding="utf-8"?>
+<file path=ppt/slides/slide6.xml><?xml version="1.0" encoding="utf-8"?>
 <p:sld xmlns:a="http://schemas.openxmlformats.org/drawingml/2006/main" xmlns:r="http://schemas.openxmlformats.org/officeDocument/2006/relationships" xmlns:p="http://schemas.openxmlformats.org/presentationml/2006/main">
   <p:cSld>
     <p:spTree>

</xml_diff>